<commit_message>
Added report, plots, and comments
</commit_message>
<xml_diff>
--- a/presentation.pptx
+++ b/presentation.pptx
@@ -12,10 +12,11 @@
     <p:sldId id="270" r:id="rId6"/>
     <p:sldId id="285" r:id="rId7"/>
     <p:sldId id="281" r:id="rId8"/>
-    <p:sldId id="283" r:id="rId9"/>
-    <p:sldId id="282" r:id="rId10"/>
-    <p:sldId id="284" r:id="rId11"/>
-    <p:sldId id="279" r:id="rId12"/>
+    <p:sldId id="286" r:id="rId9"/>
+    <p:sldId id="283" r:id="rId10"/>
+    <p:sldId id="282" r:id="rId11"/>
+    <p:sldId id="284" r:id="rId12"/>
+    <p:sldId id="279" r:id="rId13"/>
   </p:sldIdLst>
   <p:sldSz cx="12192000" cy="6858000"/>
   <p:notesSz cx="6858000" cy="9144000"/>
@@ -8086,7 +8087,7 @@
           <a:effectLst/>
           <a:extLst>
             <a:ext uri="{91240B29-F687-4f45-9708-019B960494DF}">
-              <a14:hiddenLine xmlns="" xmlns:a14="http://schemas.microsoft.com/office/drawing/2010/main" w="9525">
+              <a14:hiddenLine xmlns:a14="http://schemas.microsoft.com/office/drawing/2010/main" xmlns="" w="9525">
                 <a:solidFill>
                   <a:srgbClr val="000000"/>
                 </a:solidFill>
@@ -8279,7 +8280,7 @@
             <a:fld id="{08B9EBBA-996F-894A-B54A-D6246ED52CEA}" type="datetimeFigureOut">
               <a:rPr lang="en-US" dirty="0"/>
               <a:pPr/>
-              <a:t>12/7/20</a:t>
+              <a:t>12/17/20</a:t>
             </a:fld>
             <a:endParaRPr lang="en-US" dirty="0"/>
           </a:p>
@@ -8594,7 +8595,7 @@
             <a:fld id="{18C79C5D-2A6F-F04D-97DA-BEF2467B64E4}" type="datetimeFigureOut">
               <a:rPr lang="en-US" dirty="0"/>
               <a:pPr/>
-              <a:t>12/7/20</a:t>
+              <a:t>12/17/20</a:t>
             </a:fld>
             <a:endParaRPr lang="en-US" dirty="0"/>
           </a:p>
@@ -9079,7 +9080,7 @@
             <a:fld id="{8DFA1846-DA80-1C48-A609-854EA85C59AD}" type="datetimeFigureOut">
               <a:rPr lang="en-US" dirty="0"/>
               <a:pPr/>
-              <a:t>12/7/20</a:t>
+              <a:t>12/17/20</a:t>
             </a:fld>
             <a:endParaRPr lang="en-US" dirty="0"/>
           </a:p>
@@ -9445,7 +9446,7 @@
             <a:fld id="{FBF54567-0DE4-3F47-BF90-CB84690072F9}" type="datetimeFigureOut">
               <a:rPr lang="en-US" dirty="0"/>
               <a:pPr/>
-              <a:t>12/7/20</a:t>
+              <a:t>12/17/20</a:t>
             </a:fld>
             <a:endParaRPr lang="en-US" dirty="0"/>
           </a:p>
@@ -9596,7 +9597,7 @@
           <a:ln/>
           <a:extLst>
             <a:ext uri="{91240B29-F687-4f45-9708-019B960494DF}">
-              <a14:hiddenLine xmlns="" xmlns:a14="http://schemas.microsoft.com/office/drawing/2010/main" w="9525">
+              <a14:hiddenLine xmlns:a14="http://schemas.microsoft.com/office/drawing/2010/main" xmlns="" w="9525">
                 <a:solidFill>
                   <a:srgbClr val="000000"/>
                 </a:solidFill>
@@ -9715,7 +9716,7 @@
             <a:fld id="{C6C52C72-DE31-F449-A4ED-4C594FD91407}" type="datetimeFigureOut">
               <a:rPr lang="en-US" dirty="0"/>
               <a:pPr/>
-              <a:t>12/7/20</a:t>
+              <a:t>12/17/20</a:t>
             </a:fld>
             <a:endParaRPr lang="en-US" dirty="0"/>
           </a:p>
@@ -9868,7 +9869,7 @@
           <a:ln/>
           <a:extLst>
             <a:ext uri="{91240B29-F687-4f45-9708-019B960494DF}">
-              <a14:hiddenLine xmlns="" xmlns:a14="http://schemas.microsoft.com/office/drawing/2010/main" w="9525">
+              <a14:hiddenLine xmlns:a14="http://schemas.microsoft.com/office/drawing/2010/main" xmlns="" w="9525">
                 <a:solidFill>
                   <a:srgbClr val="000000"/>
                 </a:solidFill>
@@ -9997,7 +9998,7 @@
             <a:fld id="{ED62726E-379B-B349-9EED-81ED093FA806}" type="datetimeFigureOut">
               <a:rPr lang="en-US" dirty="0"/>
               <a:pPr/>
-              <a:t>12/7/20</a:t>
+              <a:t>12/17/20</a:t>
             </a:fld>
             <a:endParaRPr lang="en-US" dirty="0"/>
           </a:p>
@@ -10148,7 +10149,7 @@
           <a:ln/>
           <a:extLst>
             <a:ext uri="{91240B29-F687-4f45-9708-019B960494DF}">
-              <a14:hiddenLine xmlns="" xmlns:a14="http://schemas.microsoft.com/office/drawing/2010/main" w="9525">
+              <a14:hiddenLine xmlns:a14="http://schemas.microsoft.com/office/drawing/2010/main" xmlns="" w="9525">
                 <a:solidFill>
                   <a:srgbClr val="000000"/>
                 </a:solidFill>
@@ -10277,7 +10278,7 @@
             <a:fld id="{9B3A1323-8D79-1946-B0D7-40001CF92E9D}" type="datetimeFigureOut">
               <a:rPr lang="en-US" dirty="0"/>
               <a:pPr/>
-              <a:t>12/7/20</a:t>
+              <a:t>12/17/20</a:t>
             </a:fld>
             <a:endParaRPr lang="en-US" dirty="0"/>
           </a:p>
@@ -10617,7 +10618,7 @@
             <a:fld id="{8DFA1846-DA80-1C48-A609-854EA85C59AD}" type="datetimeFigureOut">
               <a:rPr lang="en-US" dirty="0"/>
               <a:pPr/>
-              <a:t>12/7/20</a:t>
+              <a:t>12/17/20</a:t>
             </a:fld>
             <a:endParaRPr lang="en-US" dirty="0"/>
           </a:p>
@@ -10768,7 +10769,7 @@
           <a:ln/>
           <a:extLst>
             <a:ext uri="{91240B29-F687-4f45-9708-019B960494DF}">
-              <a14:hiddenLine xmlns="" xmlns:a14="http://schemas.microsoft.com/office/drawing/2010/main" w="9525">
+              <a14:hiddenLine xmlns:a14="http://schemas.microsoft.com/office/drawing/2010/main" xmlns="" w="9525">
                 <a:solidFill>
                   <a:srgbClr val="000000"/>
                 </a:solidFill>
@@ -10953,7 +10954,7 @@
             <a:fld id="{57302355-E14B-8545-A8F8-0FE83CC9D524}" type="datetimeFigureOut">
               <a:rPr lang="en-US" dirty="0"/>
               <a:pPr/>
-              <a:t>12/7/20</a:t>
+              <a:t>12/17/20</a:t>
             </a:fld>
             <a:endParaRPr lang="en-US" dirty="0"/>
           </a:p>
@@ -11104,7 +11105,7 @@
           <a:ln/>
           <a:extLst>
             <a:ext uri="{91240B29-F687-4f45-9708-019B960494DF}">
-              <a14:hiddenLine xmlns="" xmlns:a14="http://schemas.microsoft.com/office/drawing/2010/main" w="9525">
+              <a14:hiddenLine xmlns:a14="http://schemas.microsoft.com/office/drawing/2010/main" xmlns="" w="9525">
                 <a:solidFill>
                   <a:srgbClr val="000000"/>
                 </a:solidFill>
@@ -11427,7 +11428,7 @@
             <a:fld id="{02640F58-564D-2B4F-AE67-E407BA4FCF45}" type="datetimeFigureOut">
               <a:rPr lang="en-US" dirty="0"/>
               <a:pPr/>
-              <a:t>12/7/20</a:t>
+              <a:t>12/17/20</a:t>
             </a:fld>
             <a:endParaRPr lang="en-US" dirty="0"/>
           </a:p>
@@ -11578,7 +11579,7 @@
           <a:ln/>
           <a:extLst>
             <a:ext uri="{91240B29-F687-4f45-9708-019B960494DF}">
-              <a14:hiddenLine xmlns="" xmlns:a14="http://schemas.microsoft.com/office/drawing/2010/main" w="9525">
+              <a14:hiddenLine xmlns:a14="http://schemas.microsoft.com/office/drawing/2010/main" xmlns="" w="9525">
                 <a:solidFill>
                   <a:srgbClr val="000000"/>
                 </a:solidFill>
@@ -11645,7 +11646,7 @@
             <a:fld id="{F13A34C8-038E-2045-AF43-DF7DBB8E0E9E}" type="datetimeFigureOut">
               <a:rPr lang="en-US" dirty="0"/>
               <a:pPr/>
-              <a:t>12/7/20</a:t>
+              <a:t>12/17/20</a:t>
             </a:fld>
             <a:endParaRPr lang="en-US" dirty="0"/>
           </a:p>
@@ -11737,7 +11738,7 @@
             <a:fld id="{8818C68F-D26B-8F47-958C-23B49CF8A634}" type="datetimeFigureOut">
               <a:rPr lang="en-US" dirty="0"/>
               <a:pPr/>
-              <a:t>12/7/20</a:t>
+              <a:t>12/17/20</a:t>
             </a:fld>
             <a:endParaRPr lang="en-US" dirty="0"/>
           </a:p>
@@ -12001,7 +12002,7 @@
           <a:ln/>
           <a:extLst>
             <a:ext uri="{91240B29-F687-4f45-9708-019B960494DF}">
-              <a14:hiddenLine xmlns="" xmlns:a14="http://schemas.microsoft.com/office/drawing/2010/main" w="9525">
+              <a14:hiddenLine xmlns:a14="http://schemas.microsoft.com/office/drawing/2010/main" xmlns="" w="9525">
                 <a:solidFill>
                   <a:srgbClr val="000000"/>
                 </a:solidFill>
@@ -12201,7 +12202,7 @@
             <a:fld id="{D0DF5E60-9974-AC48-9591-99C2BB44B7CF}" type="datetimeFigureOut">
               <a:rPr lang="en-US" dirty="0"/>
               <a:pPr/>
-              <a:t>12/7/20</a:t>
+              <a:t>12/17/20</a:t>
             </a:fld>
             <a:endParaRPr lang="en-US" dirty="0"/>
           </a:p>
@@ -12511,7 +12512,7 @@
             <a:fld id="{18C79C5D-2A6F-F04D-97DA-BEF2467B64E4}" type="datetimeFigureOut">
               <a:rPr lang="en-US" dirty="0"/>
               <a:pPr/>
-              <a:t>12/7/20</a:t>
+              <a:t>12/17/20</a:t>
             </a:fld>
             <a:endParaRPr lang="en-US" dirty="0"/>
           </a:p>
@@ -12778,7 +12779,7 @@
             <a:fld id="{09B482E8-6E0E-1B4F-B1FD-C69DB9E858D9}" type="datetimeFigureOut">
               <a:rPr lang="en-US" dirty="0"/>
               <a:pPr/>
-              <a:t>12/7/20</a:t>
+              <a:t>12/17/20</a:t>
             </a:fld>
             <a:endParaRPr lang="en-US" dirty="0"/>
           </a:p>
@@ -13814,6 +13815,357 @@
 <file path=ppt/slides/slide10.xml><?xml version="1.0" encoding="utf-8"?>
 <p:sld xmlns:a="http://schemas.openxmlformats.org/drawingml/2006/main" xmlns:r="http://schemas.openxmlformats.org/officeDocument/2006/relationships" xmlns:p="http://schemas.openxmlformats.org/presentationml/2006/main">
   <p:cSld>
+    <p:spTree>
+      <p:nvGrpSpPr>
+        <p:cNvPr id="1" name=""/>
+        <p:cNvGrpSpPr/>
+        <p:nvPr/>
+      </p:nvGrpSpPr>
+      <p:grpSpPr>
+        <a:xfrm>
+          <a:off x="0" y="0"/>
+          <a:ext cx="0" cy="0"/>
+          <a:chOff x="0" y="0"/>
+          <a:chExt cx="0" cy="0"/>
+        </a:xfrm>
+      </p:grpSpPr>
+      <p:sp>
+        <p:nvSpPr>
+          <p:cNvPr id="2" name="Title 1">
+            <a:extLst>
+              <a:ext uri="{FF2B5EF4-FFF2-40B4-BE49-F238E27FC236}">
+                <a16:creationId xmlns:a16="http://schemas.microsoft.com/office/drawing/2014/main" id="{2473E1A0-9C6F-D149-96C5-5B9801F1AA1C}"/>
+              </a:ext>
+            </a:extLst>
+          </p:cNvPr>
+          <p:cNvSpPr>
+            <a:spLocks noGrp="1"/>
+          </p:cNvSpPr>
+          <p:nvPr>
+            <p:ph type="title"/>
+          </p:nvPr>
+        </p:nvSpPr>
+        <p:spPr/>
+        <p:txBody>
+          <a:bodyPr/>
+          <a:lstStyle/>
+          <a:p>
+            <a:r>
+              <a:rPr lang="en-US" dirty="0"/>
+              <a:t>Issues So Far</a:t>
+            </a:r>
+          </a:p>
+        </p:txBody>
+      </p:sp>
+      <p:sp>
+        <p:nvSpPr>
+          <p:cNvPr id="3" name="Content Placeholder 2">
+            <a:extLst>
+              <a:ext uri="{FF2B5EF4-FFF2-40B4-BE49-F238E27FC236}">
+                <a16:creationId xmlns:a16="http://schemas.microsoft.com/office/drawing/2014/main" id="{530BE401-7E09-1347-A74D-C202C26C8E69}"/>
+              </a:ext>
+            </a:extLst>
+          </p:cNvPr>
+          <p:cNvSpPr>
+            <a:spLocks noGrp="1"/>
+          </p:cNvSpPr>
+          <p:nvPr>
+            <p:ph idx="1"/>
+          </p:nvPr>
+        </p:nvSpPr>
+        <p:spPr>
+          <a:xfrm>
+            <a:off x="379800" y="2267712"/>
+            <a:ext cx="7679111" cy="4143100"/>
+          </a:xfrm>
+        </p:spPr>
+        <p:txBody>
+          <a:bodyPr>
+            <a:normAutofit/>
+          </a:bodyPr>
+          <a:lstStyle/>
+          <a:p>
+            <a:r>
+              <a:rPr lang="en-US" sz="2400" dirty="0"/>
+              <a:t>Dataset not labelled for events </a:t>
+            </a:r>
+            <a:r>
+              <a:rPr lang="en-US" sz="2400" dirty="0">
+                <a:sym typeface="Wingdings" pitchFamily="2" charset="2"/>
+              </a:rPr>
+              <a:t> keywords</a:t>
+            </a:r>
+          </a:p>
+          <a:p>
+            <a:r>
+              <a:rPr lang="en-US" sz="2400" dirty="0">
+                <a:sym typeface="Wingdings" pitchFamily="2" charset="2"/>
+              </a:rPr>
+              <a:t>Articles with common keywords have uneven distribution</a:t>
+            </a:r>
+          </a:p>
+          <a:p>
+            <a:pPr marL="0" indent="0">
+              <a:buNone/>
+            </a:pPr>
+            <a:endParaRPr lang="en-US" sz="2400" dirty="0">
+              <a:sym typeface="Wingdings" pitchFamily="2" charset="2"/>
+            </a:endParaRPr>
+          </a:p>
+          <a:p>
+            <a:r>
+              <a:rPr lang="en-US" sz="2400" dirty="0">
+                <a:sym typeface="Wingdings" pitchFamily="2" charset="2"/>
+              </a:rPr>
+              <a:t>CUDA Memory issues  Using CPU</a:t>
+            </a:r>
+          </a:p>
+          <a:p>
+            <a:r>
+              <a:rPr lang="en-US" sz="2400" dirty="0">
+                <a:sym typeface="Wingdings" pitchFamily="2" charset="2"/>
+              </a:rPr>
+              <a:t>Slow performance (1 epoch taking 7+ hours) </a:t>
+            </a:r>
+          </a:p>
+          <a:p>
+            <a:pPr lvl="1"/>
+            <a:r>
+              <a:rPr lang="en-US" sz="1800" dirty="0">
+                <a:sym typeface="Wingdings" pitchFamily="2" charset="2"/>
+              </a:rPr>
+              <a:t> No performance results yet</a:t>
+            </a:r>
+          </a:p>
+          <a:p>
+            <a:endParaRPr lang="en-US" dirty="0"/>
+          </a:p>
+        </p:txBody>
+      </p:sp>
+      <p:grpSp>
+        <p:nvGrpSpPr>
+          <p:cNvPr id="10" name="Group 9">
+            <a:extLst>
+              <a:ext uri="{FF2B5EF4-FFF2-40B4-BE49-F238E27FC236}">
+                <a16:creationId xmlns:a16="http://schemas.microsoft.com/office/drawing/2014/main" id="{5DE90424-EEF2-344A-BABD-F5923B4EE34C}"/>
+              </a:ext>
+            </a:extLst>
+          </p:cNvPr>
+          <p:cNvGrpSpPr/>
+          <p:nvPr/>
+        </p:nvGrpSpPr>
+        <p:grpSpPr>
+          <a:xfrm>
+            <a:off x="7943088" y="0"/>
+            <a:ext cx="4248913" cy="6858001"/>
+            <a:chOff x="7943088" y="0"/>
+            <a:chExt cx="4248913" cy="6858001"/>
+          </a:xfrm>
+        </p:grpSpPr>
+        <p:sp>
+          <p:nvSpPr>
+            <p:cNvPr id="8" name="Rectangle 7">
+              <a:extLst>
+                <a:ext uri="{FF2B5EF4-FFF2-40B4-BE49-F238E27FC236}">
+                  <a16:creationId xmlns:a16="http://schemas.microsoft.com/office/drawing/2014/main" id="{4F1F66F9-73B9-F345-B94E-44B8BD16DEDA}"/>
+                </a:ext>
+              </a:extLst>
+            </p:cNvPr>
+            <p:cNvSpPr/>
+            <p:nvPr/>
+          </p:nvSpPr>
+          <p:spPr>
+            <a:xfrm>
+              <a:off x="7943088" y="0"/>
+              <a:ext cx="4248912" cy="6858000"/>
+            </a:xfrm>
+            <a:prstGeom prst="rect">
+              <a:avLst/>
+            </a:prstGeom>
+            <a:solidFill>
+              <a:schemeClr val="tx1"/>
+            </a:solidFill>
+          </p:spPr>
+          <p:style>
+            <a:lnRef idx="2">
+              <a:schemeClr val="accent1">
+                <a:shade val="50000"/>
+              </a:schemeClr>
+            </a:lnRef>
+            <a:fillRef idx="1">
+              <a:schemeClr val="accent1"/>
+            </a:fillRef>
+            <a:effectRef idx="0">
+              <a:schemeClr val="accent1"/>
+            </a:effectRef>
+            <a:fontRef idx="minor">
+              <a:schemeClr val="lt1"/>
+            </a:fontRef>
+          </p:style>
+          <p:txBody>
+            <a:bodyPr rtlCol="0" anchor="ctr"/>
+            <a:lstStyle/>
+            <a:p>
+              <a:pPr algn="ctr"/>
+              <a:endParaRPr lang="en-US" dirty="0"/>
+            </a:p>
+          </p:txBody>
+        </p:sp>
+        <p:pic>
+          <p:nvPicPr>
+            <p:cNvPr id="5" name="Picture 4">
+              <a:extLst>
+                <a:ext uri="{FF2B5EF4-FFF2-40B4-BE49-F238E27FC236}">
+                  <a16:creationId xmlns:a16="http://schemas.microsoft.com/office/drawing/2014/main" id="{D966ED10-4156-D740-8C3B-5DEB7BD547DE}"/>
+                </a:ext>
+              </a:extLst>
+            </p:cNvPr>
+            <p:cNvPicPr>
+              <a:picLocks noChangeAspect="1"/>
+            </p:cNvPicPr>
+            <p:nvPr/>
+          </p:nvPicPr>
+          <p:blipFill>
+            <a:blip r:embed="rId2"/>
+            <a:stretch>
+              <a:fillRect/>
+            </a:stretch>
+          </p:blipFill>
+          <p:spPr>
+            <a:xfrm>
+              <a:off x="8058912" y="184666"/>
+              <a:ext cx="4133088" cy="3041993"/>
+            </a:xfrm>
+            <a:prstGeom prst="rect">
+              <a:avLst/>
+            </a:prstGeom>
+          </p:spPr>
+        </p:pic>
+        <p:sp>
+          <p:nvSpPr>
+            <p:cNvPr id="6" name="Rectangle 5">
+              <a:extLst>
+                <a:ext uri="{FF2B5EF4-FFF2-40B4-BE49-F238E27FC236}">
+                  <a16:creationId xmlns:a16="http://schemas.microsoft.com/office/drawing/2014/main" id="{5A18FE7D-9BC0-AB48-8C30-D547B7CD2D42}"/>
+                </a:ext>
+              </a:extLst>
+            </p:cNvPr>
+            <p:cNvSpPr/>
+            <p:nvPr/>
+          </p:nvSpPr>
+          <p:spPr>
+            <a:xfrm>
+              <a:off x="8058912" y="0"/>
+              <a:ext cx="4133088" cy="369332"/>
+            </a:xfrm>
+            <a:prstGeom prst="rect">
+              <a:avLst/>
+            </a:prstGeom>
+          </p:spPr>
+          <p:txBody>
+            <a:bodyPr wrap="square">
+              <a:spAutoFit/>
+            </a:bodyPr>
+            <a:lstStyle/>
+            <a:p>
+              <a:pPr algn="ctr"/>
+              <a:r>
+                <a:rPr lang="en-US" dirty="0">
+                  <a:solidFill>
+                    <a:schemeClr val="bg1"/>
+                  </a:solidFill>
+                </a:rPr>
+                <a:t>Fake/Real distribution (unfiltered)</a:t>
+              </a:r>
+            </a:p>
+          </p:txBody>
+        </p:sp>
+        <p:pic>
+          <p:nvPicPr>
+            <p:cNvPr id="7" name="Picture 6">
+              <a:extLst>
+                <a:ext uri="{FF2B5EF4-FFF2-40B4-BE49-F238E27FC236}">
+                  <a16:creationId xmlns:a16="http://schemas.microsoft.com/office/drawing/2014/main" id="{9B8B4584-D84D-F14F-98B3-8274B00F7F4D}"/>
+                </a:ext>
+              </a:extLst>
+            </p:cNvPr>
+            <p:cNvPicPr>
+              <a:picLocks noChangeAspect="1"/>
+            </p:cNvPicPr>
+            <p:nvPr/>
+          </p:nvPicPr>
+          <p:blipFill>
+            <a:blip r:embed="rId3"/>
+            <a:stretch>
+              <a:fillRect/>
+            </a:stretch>
+          </p:blipFill>
+          <p:spPr>
+            <a:xfrm>
+              <a:off x="8058913" y="3941407"/>
+              <a:ext cx="4133088" cy="2916594"/>
+            </a:xfrm>
+            <a:prstGeom prst="rect">
+              <a:avLst/>
+            </a:prstGeom>
+          </p:spPr>
+        </p:pic>
+        <p:sp>
+          <p:nvSpPr>
+            <p:cNvPr id="9" name="Rectangle 8">
+              <a:extLst>
+                <a:ext uri="{FF2B5EF4-FFF2-40B4-BE49-F238E27FC236}">
+                  <a16:creationId xmlns:a16="http://schemas.microsoft.com/office/drawing/2014/main" id="{B7B7C281-36F2-2F41-9065-A200FDFE00E1}"/>
+                </a:ext>
+              </a:extLst>
+            </p:cNvPr>
+            <p:cNvSpPr/>
+            <p:nvPr/>
+          </p:nvSpPr>
+          <p:spPr>
+            <a:xfrm>
+              <a:off x="8058912" y="3631342"/>
+              <a:ext cx="4133088" cy="369332"/>
+            </a:xfrm>
+            <a:prstGeom prst="rect">
+              <a:avLst/>
+            </a:prstGeom>
+          </p:spPr>
+          <p:txBody>
+            <a:bodyPr wrap="square">
+              <a:spAutoFit/>
+            </a:bodyPr>
+            <a:lstStyle/>
+            <a:p>
+              <a:pPr algn="ctr"/>
+              <a:r>
+                <a:rPr lang="en-US" dirty="0">
+                  <a:solidFill>
+                    <a:schemeClr val="bg1"/>
+                  </a:solidFill>
+                </a:rPr>
+                <a:t>Fake/Real distribution (filtered)</a:t>
+              </a:r>
+            </a:p>
+          </p:txBody>
+        </p:sp>
+      </p:grpSp>
+    </p:spTree>
+    <p:extLst>
+      <p:ext uri="{BB962C8B-B14F-4D97-AF65-F5344CB8AC3E}">
+        <p14:creationId xmlns:p14="http://schemas.microsoft.com/office/powerpoint/2010/main" val="1201209374"/>
+      </p:ext>
+    </p:extLst>
+  </p:cSld>
+  <p:clrMapOvr>
+    <a:masterClrMapping/>
+  </p:clrMapOvr>
+</p:sld>
+</file>
+
+<file path=ppt/slides/slide11.xml><?xml version="1.0" encoding="utf-8"?>
+<p:sld xmlns:a="http://schemas.openxmlformats.org/drawingml/2006/main" xmlns:r="http://schemas.openxmlformats.org/officeDocument/2006/relationships" xmlns:p="http://schemas.openxmlformats.org/presentationml/2006/main">
+  <p:cSld>
     <p:bg>
       <p:bgPr>
         <a:solidFill>
@@ -13949,7 +14301,7 @@
 </p:sld>
 </file>
 
-<file path=ppt/slides/slide11.xml><?xml version="1.0" encoding="utf-8"?>
+<file path=ppt/slides/slide12.xml><?xml version="1.0" encoding="utf-8"?>
 <p:sld xmlns:a="http://schemas.openxmlformats.org/drawingml/2006/main" xmlns:r="http://schemas.openxmlformats.org/officeDocument/2006/relationships" xmlns:p="http://schemas.openxmlformats.org/presentationml/2006/main">
   <p:cSld>
     <p:spTree>
@@ -14432,7 +14784,7 @@
           <a:effectLst/>
           <a:extLst>
             <a:ext uri="{91240B29-F687-4f45-9708-019B960494DF}">
-              <a14:hiddenLine xmlns:a16="http://schemas.microsoft.com/office/drawing/2014/main" xmlns:a14="http://schemas.microsoft.com/office/drawing/2010/main" xmlns="" w="9525">
+              <a14:hiddenLine xmlns="" xmlns:a14="http://schemas.microsoft.com/office/drawing/2010/main" xmlns:a16="http://schemas.microsoft.com/office/drawing/2014/main" w="9525">
                 <a:solidFill>
                   <a:srgbClr val="000000"/>
                 </a:solidFill>
@@ -15646,7 +15998,7 @@
         </p:nvSpPr>
         <p:spPr>
           <a:xfrm>
-            <a:off x="263474" y="3224545"/>
+            <a:off x="810000" y="3207293"/>
             <a:ext cx="1733550" cy="2308324"/>
           </a:xfrm>
           <a:prstGeom prst="rect">
@@ -15700,7 +16052,7 @@
         </p:nvSpPr>
         <p:spPr>
           <a:xfrm>
-            <a:off x="1825399" y="2445842"/>
+            <a:off x="2362443" y="2434353"/>
             <a:ext cx="1898277" cy="369332"/>
           </a:xfrm>
           <a:prstGeom prst="rect">
@@ -15713,6 +16065,7 @@
           </a:bodyPr>
           <a:lstStyle/>
           <a:p>
+            <a:pPr algn="ctr"/>
             <a:r>
               <a:rPr lang="en-US" dirty="0"/>
               <a:t>BERT TOKENIZER</a:t>
@@ -15734,8 +16087,8 @@
         </p:nvSpPr>
         <p:spPr>
           <a:xfrm>
-            <a:off x="3494990" y="4056736"/>
-            <a:ext cx="1394686" cy="646331"/>
+            <a:off x="3868240" y="4039840"/>
+            <a:ext cx="897893" cy="646331"/>
           </a:xfrm>
           <a:prstGeom prst="rect">
             <a:avLst/>
@@ -15790,7 +16143,7 @@
         </p:nvGrpSpPr>
         <p:grpSpPr>
           <a:xfrm>
-            <a:off x="2460021" y="3225741"/>
+            <a:off x="3006547" y="3208489"/>
             <a:ext cx="614175" cy="2308324"/>
             <a:chOff x="3224400" y="2809876"/>
             <a:chExt cx="614175" cy="2308324"/>
@@ -16053,7 +16406,63 @@
         </p:nvSpPr>
         <p:spPr>
           <a:xfrm rot="5400000">
-            <a:off x="4643159" y="4191432"/>
+            <a:off x="4629810" y="4041553"/>
+            <a:ext cx="1394686" cy="646331"/>
+          </a:xfrm>
+          <a:prstGeom prst="rect">
+            <a:avLst/>
+          </a:prstGeom>
+          <a:solidFill>
+            <a:schemeClr val="accent1"/>
+          </a:solidFill>
+        </p:spPr>
+        <p:style>
+          <a:lnRef idx="2">
+            <a:schemeClr val="accent1"/>
+          </a:lnRef>
+          <a:fillRef idx="1">
+            <a:schemeClr val="lt1"/>
+          </a:fillRef>
+          <a:effectRef idx="0">
+            <a:schemeClr val="accent1"/>
+          </a:effectRef>
+          <a:fontRef idx="minor">
+            <a:schemeClr val="dk1"/>
+          </a:fontRef>
+        </p:style>
+        <p:txBody>
+          <a:bodyPr wrap="square" rtlCol="0">
+            <a:spAutoFit/>
+          </a:bodyPr>
+          <a:lstStyle/>
+          <a:p>
+            <a:pPr algn="ctr"/>
+            <a:r>
+              <a:rPr lang="en-US" dirty="0">
+                <a:solidFill>
+                  <a:schemeClr val="tx1"/>
+                </a:solidFill>
+              </a:rPr>
+              <a:t>Pooled CLS Token</a:t>
+            </a:r>
+          </a:p>
+        </p:txBody>
+      </p:sp>
+      <p:sp>
+        <p:nvSpPr>
+          <p:cNvPr id="28" name="TextBox 27">
+            <a:extLst>
+              <a:ext uri="{FF2B5EF4-FFF2-40B4-BE49-F238E27FC236}">
+                <a16:creationId xmlns:a16="http://schemas.microsoft.com/office/drawing/2014/main" id="{E70461FD-6A9B-8E4E-9C82-3A2AD64E8153}"/>
+              </a:ext>
+            </a:extLst>
+          </p:cNvPr>
+          <p:cNvSpPr txBox="1"/>
+          <p:nvPr/>
+        </p:nvSpPr>
+        <p:spPr>
+          <a:xfrm rot="5400000">
+            <a:off x="5383055" y="4180053"/>
             <a:ext cx="1394686" cy="369332"/>
           </a:xfrm>
           <a:prstGeom prst="rect">
@@ -16090,17 +16499,17 @@
                   <a:schemeClr val="tx1"/>
                 </a:solidFill>
               </a:rPr>
-              <a:t>dropout</a:t>
+              <a:t>Linear</a:t>
             </a:r>
           </a:p>
         </p:txBody>
       </p:sp>
       <p:sp>
         <p:nvSpPr>
-          <p:cNvPr id="28" name="TextBox 27">
+          <p:cNvPr id="29" name="TextBox 28">
             <a:extLst>
               <a:ext uri="{FF2B5EF4-FFF2-40B4-BE49-F238E27FC236}">
-                <a16:creationId xmlns:a16="http://schemas.microsoft.com/office/drawing/2014/main" id="{E70461FD-6A9B-8E4E-9C82-3A2AD64E8153}"/>
+                <a16:creationId xmlns:a16="http://schemas.microsoft.com/office/drawing/2014/main" id="{06445417-D613-1641-9898-A6747B28DAC2}"/>
               </a:ext>
             </a:extLst>
           </p:cNvPr>
@@ -16109,7 +16518,7 @@
         </p:nvSpPr>
         <p:spPr>
           <a:xfrm rot="5400000">
-            <a:off x="5303083" y="4187183"/>
+            <a:off x="5993163" y="4180052"/>
             <a:ext cx="1394686" cy="369332"/>
           </a:xfrm>
           <a:prstGeom prst="rect">
@@ -16146,69 +16555,8 @@
                   <a:schemeClr val="tx1"/>
                 </a:solidFill>
               </a:rPr>
-              <a:t>linear</a:t>
+              <a:t>LeakyReLu</a:t>
             </a:r>
-          </a:p>
-        </p:txBody>
-      </p:sp>
-      <p:sp>
-        <p:nvSpPr>
-          <p:cNvPr id="29" name="TextBox 28">
-            <a:extLst>
-              <a:ext uri="{FF2B5EF4-FFF2-40B4-BE49-F238E27FC236}">
-                <a16:creationId xmlns:a16="http://schemas.microsoft.com/office/drawing/2014/main" id="{06445417-D613-1641-9898-A6747B28DAC2}"/>
-              </a:ext>
-            </a:extLst>
-          </p:cNvPr>
-          <p:cNvSpPr txBox="1"/>
-          <p:nvPr/>
-        </p:nvSpPr>
-        <p:spPr>
-          <a:xfrm rot="5400000">
-            <a:off x="5949950" y="4187183"/>
-            <a:ext cx="1394686" cy="369332"/>
-          </a:xfrm>
-          <a:prstGeom prst="rect">
-            <a:avLst/>
-          </a:prstGeom>
-          <a:solidFill>
-            <a:schemeClr val="accent1"/>
-          </a:solidFill>
-        </p:spPr>
-        <p:style>
-          <a:lnRef idx="2">
-            <a:schemeClr val="accent1"/>
-          </a:lnRef>
-          <a:fillRef idx="1">
-            <a:schemeClr val="lt1"/>
-          </a:fillRef>
-          <a:effectRef idx="0">
-            <a:schemeClr val="accent1"/>
-          </a:effectRef>
-          <a:fontRef idx="minor">
-            <a:schemeClr val="dk1"/>
-          </a:fontRef>
-        </p:style>
-        <p:txBody>
-          <a:bodyPr wrap="square" rtlCol="0">
-            <a:spAutoFit/>
-          </a:bodyPr>
-          <a:lstStyle/>
-          <a:p>
-            <a:pPr algn="ctr"/>
-            <a:r>
-              <a:rPr lang="en-US" dirty="0" err="1">
-                <a:solidFill>
-                  <a:schemeClr val="tx1"/>
-                </a:solidFill>
-              </a:rPr>
-              <a:t>relu</a:t>
-            </a:r>
-            <a:endParaRPr lang="en-US" dirty="0">
-              <a:solidFill>
-                <a:schemeClr val="tx1"/>
-              </a:solidFill>
-            </a:endParaRPr>
           </a:p>
         </p:txBody>
       </p:sp>
@@ -16226,7 +16574,7 @@
         </p:nvSpPr>
         <p:spPr>
           <a:xfrm rot="5400000">
-            <a:off x="8468963" y="3140802"/>
+            <a:off x="8006197" y="3123550"/>
             <a:ext cx="1394686" cy="369332"/>
           </a:xfrm>
           <a:prstGeom prst="rect">
@@ -16263,7 +16611,7 @@
                   <a:schemeClr val="tx1"/>
                 </a:solidFill>
               </a:rPr>
-              <a:t>linear</a:t>
+              <a:t>Linear</a:t>
             </a:r>
           </a:p>
         </p:txBody>
@@ -16282,7 +16630,7 @@
         </p:nvSpPr>
         <p:spPr>
           <a:xfrm rot="5400000">
-            <a:off x="9155439" y="3140802"/>
+            <a:off x="8692673" y="3123550"/>
             <a:ext cx="1394686" cy="369332"/>
           </a:xfrm>
           <a:prstGeom prst="rect">
@@ -16314,18 +16662,13 @@
           <a:p>
             <a:pPr algn="ctr"/>
             <a:r>
-              <a:rPr lang="en-US" dirty="0" err="1">
+              <a:rPr lang="en-US" dirty="0">
                 <a:solidFill>
                   <a:schemeClr val="tx1"/>
                 </a:solidFill>
               </a:rPr>
-              <a:t>softmax</a:t>
+              <a:t>Softmax</a:t>
             </a:r>
-            <a:endParaRPr lang="en-US" dirty="0">
-              <a:solidFill>
-                <a:schemeClr val="tx1"/>
-              </a:solidFill>
-            </a:endParaRPr>
           </a:p>
         </p:txBody>
       </p:sp>
@@ -16343,7 +16686,7 @@
         </p:nvGrpSpPr>
         <p:grpSpPr>
           <a:xfrm>
-            <a:off x="7139871" y="3217687"/>
+            <a:off x="7158532" y="3207293"/>
             <a:ext cx="614175" cy="2308324"/>
             <a:chOff x="3224400" y="2809876"/>
             <a:chExt cx="614175" cy="2308324"/>
@@ -16606,7 +16949,7 @@
         </p:nvGrpSpPr>
         <p:grpSpPr>
           <a:xfrm>
-            <a:off x="10808248" y="2890889"/>
+            <a:off x="10345482" y="2873637"/>
             <a:ext cx="539151" cy="869158"/>
             <a:chOff x="8402177" y="2827316"/>
             <a:chExt cx="692149" cy="1287484"/>
@@ -16771,7 +17114,7 @@
         </p:nvSpPr>
         <p:spPr>
           <a:xfrm rot="5400000">
-            <a:off x="8468963" y="5213089"/>
+            <a:off x="7997565" y="5195837"/>
             <a:ext cx="1394686" cy="369332"/>
           </a:xfrm>
           <a:prstGeom prst="rect">
@@ -16808,7 +17151,7 @@
                   <a:schemeClr val="tx1"/>
                 </a:solidFill>
               </a:rPr>
-              <a:t>linear</a:t>
+              <a:t>Linear</a:t>
             </a:r>
           </a:p>
         </p:txBody>
@@ -16827,7 +17170,7 @@
         </p:nvSpPr>
         <p:spPr>
           <a:xfrm rot="5400000">
-            <a:off x="9155439" y="5217938"/>
+            <a:off x="8684041" y="5200686"/>
             <a:ext cx="1394686" cy="369332"/>
           </a:xfrm>
           <a:prstGeom prst="rect">
@@ -16859,18 +17202,13 @@
           <a:p>
             <a:pPr algn="ctr"/>
             <a:r>
-              <a:rPr lang="en-US" dirty="0" err="1">
+              <a:rPr lang="en-US" dirty="0">
                 <a:solidFill>
                   <a:schemeClr val="tx1"/>
                 </a:solidFill>
               </a:rPr>
-              <a:t>softmax</a:t>
+              <a:t>Softmax</a:t>
             </a:r>
-            <a:endParaRPr lang="en-US" dirty="0">
-              <a:solidFill>
-                <a:schemeClr val="tx1"/>
-              </a:solidFill>
-            </a:endParaRPr>
           </a:p>
         </p:txBody>
       </p:sp>
@@ -16888,7 +17226,7 @@
         </p:nvGrpSpPr>
         <p:grpSpPr>
           <a:xfrm>
-            <a:off x="10804978" y="4424118"/>
+            <a:off x="10333580" y="4406866"/>
             <a:ext cx="539151" cy="1947274"/>
             <a:chOff x="11155548" y="3910950"/>
             <a:chExt cx="692149" cy="2499862"/>
@@ -17155,8 +17493,8 @@
         </p:nvCxnSpPr>
         <p:spPr>
           <a:xfrm flipV="1">
-            <a:off x="7754046" y="3325468"/>
-            <a:ext cx="1227594" cy="1046381"/>
+            <a:off x="7772707" y="3308216"/>
+            <a:ext cx="746167" cy="1053239"/>
           </a:xfrm>
           <a:prstGeom prst="bentConnector3">
             <a:avLst/>
@@ -17198,8 +17536,8 @@
         </p:nvCxnSpPr>
         <p:spPr>
           <a:xfrm>
-            <a:off x="7754046" y="4371849"/>
-            <a:ext cx="1227594" cy="1025906"/>
+            <a:off x="7772707" y="4361455"/>
+            <a:ext cx="737535" cy="1019048"/>
           </a:xfrm>
           <a:prstGeom prst="bentConnector3">
             <a:avLst>
@@ -17242,7 +17580,7 @@
         </p:nvCxnSpPr>
         <p:spPr>
           <a:xfrm>
-            <a:off x="1997024" y="4378707"/>
+            <a:off x="2543550" y="4361455"/>
             <a:ext cx="462997" cy="1196"/>
           </a:xfrm>
           <a:prstGeom prst="straightConnector1">
@@ -17284,9 +17622,9 @@
           <p:nvPr/>
         </p:nvCxnSpPr>
         <p:spPr>
-          <a:xfrm flipV="1">
-            <a:off x="3074196" y="4379902"/>
-            <a:ext cx="420794" cy="1"/>
+          <a:xfrm>
+            <a:off x="3620722" y="4362651"/>
+            <a:ext cx="247518" cy="355"/>
           </a:xfrm>
           <a:prstGeom prst="straightConnector1">
             <a:avLst/>
@@ -17327,9 +17665,9 @@
           <p:nvPr/>
         </p:nvCxnSpPr>
         <p:spPr>
-          <a:xfrm flipV="1">
-            <a:off x="4889676" y="4376098"/>
-            <a:ext cx="266160" cy="3804"/>
+          <a:xfrm>
+            <a:off x="4766133" y="4363006"/>
+            <a:ext cx="237855" cy="1713"/>
           </a:xfrm>
           <a:prstGeom prst="straightConnector1">
             <a:avLst/>
@@ -17370,9 +17708,9 @@
           <p:nvPr/>
         </p:nvCxnSpPr>
         <p:spPr>
-          <a:xfrm flipV="1">
-            <a:off x="5525168" y="4371849"/>
-            <a:ext cx="290592" cy="4249"/>
+          <a:xfrm>
+            <a:off x="5650319" y="4364719"/>
+            <a:ext cx="245413" cy="0"/>
           </a:xfrm>
           <a:prstGeom prst="straightConnector1">
             <a:avLst/>
@@ -17413,9 +17751,9 @@
           <p:nvPr/>
         </p:nvCxnSpPr>
         <p:spPr>
-          <a:xfrm>
-            <a:off x="6185092" y="4371849"/>
-            <a:ext cx="277535" cy="0"/>
+          <a:xfrm flipV="1">
+            <a:off x="6265064" y="4364718"/>
+            <a:ext cx="240776" cy="1"/>
           </a:xfrm>
           <a:prstGeom prst="straightConnector1">
             <a:avLst/>
@@ -17456,9 +17794,9 @@
           <p:nvPr/>
         </p:nvCxnSpPr>
         <p:spPr>
-          <a:xfrm>
-            <a:off x="6831959" y="4371849"/>
-            <a:ext cx="307912" cy="0"/>
+          <a:xfrm flipV="1">
+            <a:off x="6875172" y="4361455"/>
+            <a:ext cx="283360" cy="3263"/>
           </a:xfrm>
           <a:prstGeom prst="straightConnector1">
             <a:avLst/>
@@ -17500,7 +17838,7 @@
         </p:nvCxnSpPr>
         <p:spPr>
           <a:xfrm>
-            <a:off x="9350972" y="3325468"/>
+            <a:off x="8888206" y="3308216"/>
             <a:ext cx="317144" cy="0"/>
           </a:xfrm>
           <a:prstGeom prst="straightConnector1">
@@ -17543,7 +17881,7 @@
         </p:nvCxnSpPr>
         <p:spPr>
           <a:xfrm>
-            <a:off x="10037448" y="3325468"/>
+            <a:off x="9574682" y="3308216"/>
             <a:ext cx="770800" cy="0"/>
           </a:xfrm>
           <a:prstGeom prst="straightConnector1">
@@ -17586,7 +17924,7 @@
         </p:nvCxnSpPr>
         <p:spPr>
           <a:xfrm flipV="1">
-            <a:off x="10037448" y="5397755"/>
+            <a:off x="9566050" y="5380503"/>
             <a:ext cx="767530" cy="4849"/>
           </a:xfrm>
           <a:prstGeom prst="straightConnector1">
@@ -17629,7 +17967,7 @@
         </p:nvCxnSpPr>
         <p:spPr>
           <a:xfrm>
-            <a:off x="9350972" y="5397755"/>
+            <a:off x="8879574" y="5380503"/>
             <a:ext cx="317144" cy="4849"/>
           </a:xfrm>
           <a:prstGeom prst="straightConnector1">
@@ -17668,7 +18006,7 @@
         </p:nvSpPr>
         <p:spPr>
           <a:xfrm>
-            <a:off x="6628216" y="2451605"/>
+            <a:off x="6712493" y="2509950"/>
             <a:ext cx="1627369" cy="369332"/>
           </a:xfrm>
           <a:prstGeom prst="rect">
@@ -17702,7 +18040,7 @@
         </p:nvSpPr>
         <p:spPr>
           <a:xfrm rot="5400000">
-            <a:off x="11063960" y="3178165"/>
+            <a:off x="10601194" y="3160913"/>
             <a:ext cx="1388522" cy="369332"/>
           </a:xfrm>
           <a:prstGeom prst="rect">
@@ -17736,7 +18074,7 @@
         </p:nvSpPr>
         <p:spPr>
           <a:xfrm rot="5400000">
-            <a:off x="10526169" y="5252570"/>
+            <a:off x="10054771" y="5235318"/>
             <a:ext cx="2491388" cy="369332"/>
           </a:xfrm>
           <a:prstGeom prst="rect">
@@ -17756,6 +18094,76 @@
           </a:p>
         </p:txBody>
       </p:sp>
+      <p:sp>
+        <p:nvSpPr>
+          <p:cNvPr id="50" name="Rectangle 49">
+            <a:extLst>
+              <a:ext uri="{FF2B5EF4-FFF2-40B4-BE49-F238E27FC236}">
+                <a16:creationId xmlns:a16="http://schemas.microsoft.com/office/drawing/2014/main" id="{98518D01-8DC6-B049-8CCD-811DF231B863}"/>
+              </a:ext>
+            </a:extLst>
+          </p:cNvPr>
+          <p:cNvSpPr/>
+          <p:nvPr/>
+        </p:nvSpPr>
+        <p:spPr>
+          <a:xfrm>
+            <a:off x="1302314" y="2724700"/>
+            <a:ext cx="748923" cy="369332"/>
+          </a:xfrm>
+          <a:prstGeom prst="rect">
+            <a:avLst/>
+          </a:prstGeom>
+        </p:spPr>
+        <p:txBody>
+          <a:bodyPr wrap="none">
+            <a:spAutoFit/>
+          </a:bodyPr>
+          <a:lstStyle/>
+          <a:p>
+            <a:pPr algn="ctr"/>
+            <a:r>
+              <a:rPr lang="en-US" i="1" dirty="0"/>
+              <a:t>input</a:t>
+            </a:r>
+          </a:p>
+        </p:txBody>
+      </p:sp>
+      <p:sp>
+        <p:nvSpPr>
+          <p:cNvPr id="57" name="Rectangle 56">
+            <a:extLst>
+              <a:ext uri="{FF2B5EF4-FFF2-40B4-BE49-F238E27FC236}">
+                <a16:creationId xmlns:a16="http://schemas.microsoft.com/office/drawing/2014/main" id="{1107110B-7915-684A-AE97-A2913F53C81A}"/>
+              </a:ext>
+            </a:extLst>
+          </p:cNvPr>
+          <p:cNvSpPr/>
+          <p:nvPr/>
+        </p:nvSpPr>
+        <p:spPr>
+          <a:xfrm>
+            <a:off x="5003987" y="3308216"/>
+            <a:ext cx="643125" cy="276999"/>
+          </a:xfrm>
+          <a:prstGeom prst="rect">
+            <a:avLst/>
+          </a:prstGeom>
+        </p:spPr>
+        <p:txBody>
+          <a:bodyPr wrap="none">
+            <a:spAutoFit/>
+          </a:bodyPr>
+          <a:lstStyle/>
+          <a:p>
+            <a:pPr algn="ctr"/>
+            <a:r>
+              <a:rPr lang="en-US" sz="1200" i="1" dirty="0"/>
+              <a:t>&lt;CLS&gt;</a:t>
+            </a:r>
+          </a:p>
+        </p:txBody>
+      </p:sp>
     </p:spTree>
     <p:extLst>
       <p:ext uri="{BB962C8B-B14F-4D97-AF65-F5344CB8AC3E}">
@@ -17770,6 +18178,2501 @@
 </file>
 
 <file path=ppt/slides/slide8.xml><?xml version="1.0" encoding="utf-8"?>
+<p:sld xmlns:a="http://schemas.openxmlformats.org/drawingml/2006/main" xmlns:r="http://schemas.openxmlformats.org/officeDocument/2006/relationships" xmlns:p="http://schemas.openxmlformats.org/presentationml/2006/main">
+  <p:cSld>
+    <p:spTree>
+      <p:nvGrpSpPr>
+        <p:cNvPr id="1" name=""/>
+        <p:cNvGrpSpPr/>
+        <p:nvPr/>
+      </p:nvGrpSpPr>
+      <p:grpSpPr>
+        <a:xfrm>
+          <a:off x="0" y="0"/>
+          <a:ext cx="0" cy="0"/>
+          <a:chOff x="0" y="0"/>
+          <a:chExt cx="0" cy="0"/>
+        </a:xfrm>
+      </p:grpSpPr>
+      <p:sp>
+        <p:nvSpPr>
+          <p:cNvPr id="53" name="Rectangle 52">
+            <a:extLst>
+              <a:ext uri="{FF2B5EF4-FFF2-40B4-BE49-F238E27FC236}">
+                <a16:creationId xmlns:a16="http://schemas.microsoft.com/office/drawing/2014/main" id="{104C43BB-9B40-8D48-AB5E-7B6B95B05166}"/>
+              </a:ext>
+            </a:extLst>
+          </p:cNvPr>
+          <p:cNvSpPr/>
+          <p:nvPr/>
+        </p:nvSpPr>
+        <p:spPr>
+          <a:xfrm>
+            <a:off x="-216728" y="-335968"/>
+            <a:ext cx="12620445" cy="7565366"/>
+          </a:xfrm>
+          <a:prstGeom prst="rect">
+            <a:avLst/>
+          </a:prstGeom>
+        </p:spPr>
+        <p:style>
+          <a:lnRef idx="2">
+            <a:schemeClr val="accent6"/>
+          </a:lnRef>
+          <a:fillRef idx="1">
+            <a:schemeClr val="lt1"/>
+          </a:fillRef>
+          <a:effectRef idx="0">
+            <a:schemeClr val="accent6"/>
+          </a:effectRef>
+          <a:fontRef idx="minor">
+            <a:schemeClr val="dk1"/>
+          </a:fontRef>
+        </p:style>
+        <p:txBody>
+          <a:bodyPr rtlCol="0" anchor="ctr"/>
+          <a:lstStyle/>
+          <a:p>
+            <a:pPr algn="ctr"/>
+            <a:endParaRPr lang="en-US" dirty="0"/>
+          </a:p>
+        </p:txBody>
+      </p:sp>
+      <p:sp>
+        <p:nvSpPr>
+          <p:cNvPr id="54" name="Rectangle 53">
+            <a:extLst>
+              <a:ext uri="{FF2B5EF4-FFF2-40B4-BE49-F238E27FC236}">
+                <a16:creationId xmlns:a16="http://schemas.microsoft.com/office/drawing/2014/main" id="{88CDDA2C-05CD-1A41-8915-B84ABD676339}"/>
+              </a:ext>
+            </a:extLst>
+          </p:cNvPr>
+          <p:cNvSpPr/>
+          <p:nvPr/>
+        </p:nvSpPr>
+        <p:spPr>
+          <a:xfrm>
+            <a:off x="706869" y="2349466"/>
+            <a:ext cx="10773252" cy="4678754"/>
+          </a:xfrm>
+          <a:prstGeom prst="rect">
+            <a:avLst/>
+          </a:prstGeom>
+          <a:ln>
+            <a:solidFill>
+              <a:schemeClr val="bg1"/>
+            </a:solidFill>
+          </a:ln>
+        </p:spPr>
+        <p:style>
+          <a:lnRef idx="2">
+            <a:schemeClr val="accent6"/>
+          </a:lnRef>
+          <a:fillRef idx="1">
+            <a:schemeClr val="lt1"/>
+          </a:fillRef>
+          <a:effectRef idx="0">
+            <a:schemeClr val="accent6"/>
+          </a:effectRef>
+          <a:fontRef idx="minor">
+            <a:schemeClr val="dk1"/>
+          </a:fontRef>
+        </p:style>
+        <p:txBody>
+          <a:bodyPr rtlCol="0" anchor="ctr"/>
+          <a:lstStyle/>
+          <a:p>
+            <a:pPr algn="ctr"/>
+            <a:endParaRPr lang="en-US" dirty="0"/>
+          </a:p>
+        </p:txBody>
+      </p:sp>
+      <p:sp>
+        <p:nvSpPr>
+          <p:cNvPr id="4" name="TextBox 3">
+            <a:extLst>
+              <a:ext uri="{FF2B5EF4-FFF2-40B4-BE49-F238E27FC236}">
+                <a16:creationId xmlns:a16="http://schemas.microsoft.com/office/drawing/2014/main" id="{CED36B09-6A46-284A-8E5C-DE01258E7EA9}"/>
+              </a:ext>
+            </a:extLst>
+          </p:cNvPr>
+          <p:cNvSpPr txBox="1"/>
+          <p:nvPr/>
+        </p:nvSpPr>
+        <p:spPr>
+          <a:xfrm>
+            <a:off x="855265" y="3207293"/>
+            <a:ext cx="1733550" cy="2308324"/>
+          </a:xfrm>
+          <a:prstGeom prst="rect">
+            <a:avLst/>
+          </a:prstGeom>
+        </p:spPr>
+        <p:style>
+          <a:lnRef idx="2">
+            <a:schemeClr val="accent1"/>
+          </a:lnRef>
+          <a:fillRef idx="1">
+            <a:schemeClr val="lt1"/>
+          </a:fillRef>
+          <a:effectRef idx="0">
+            <a:schemeClr val="accent1"/>
+          </a:effectRef>
+          <a:fontRef idx="minor">
+            <a:schemeClr val="dk1"/>
+          </a:fontRef>
+        </p:style>
+        <p:txBody>
+          <a:bodyPr wrap="square" rtlCol="0">
+            <a:spAutoFit/>
+          </a:bodyPr>
+          <a:lstStyle/>
+          <a:p>
+            <a:r>
+              <a:rPr lang="en-US" dirty="0"/>
+              <a:t>Bitcoin, </a:t>
+            </a:r>
+          </a:p>
+          <a:p>
+            <a:r>
+              <a:rPr lang="en-US" dirty="0"/>
+              <a:t>&amp;, Blockchain, Searches, Exceed, Trump! Blockchain, Stocks…</a:t>
+            </a:r>
+          </a:p>
+        </p:txBody>
+      </p:sp>
+      <p:sp>
+        <p:nvSpPr>
+          <p:cNvPr id="5" name="Rectangle 4">
+            <a:extLst>
+              <a:ext uri="{FF2B5EF4-FFF2-40B4-BE49-F238E27FC236}">
+                <a16:creationId xmlns:a16="http://schemas.microsoft.com/office/drawing/2014/main" id="{BB0E743F-18F8-C145-8F4D-DC820BE03DC5}"/>
+              </a:ext>
+            </a:extLst>
+          </p:cNvPr>
+          <p:cNvSpPr/>
+          <p:nvPr/>
+        </p:nvSpPr>
+        <p:spPr>
+          <a:xfrm>
+            <a:off x="2362443" y="2434353"/>
+            <a:ext cx="1898277" cy="369332"/>
+          </a:xfrm>
+          <a:prstGeom prst="rect">
+            <a:avLst/>
+          </a:prstGeom>
+        </p:spPr>
+        <p:txBody>
+          <a:bodyPr wrap="none">
+            <a:spAutoFit/>
+          </a:bodyPr>
+          <a:lstStyle/>
+          <a:p>
+            <a:pPr algn="ctr"/>
+            <a:r>
+              <a:rPr lang="en-US" dirty="0">
+                <a:solidFill>
+                  <a:sysClr val="windowText" lastClr="000000"/>
+                </a:solidFill>
+              </a:rPr>
+              <a:t>BERT TOKENIZER</a:t>
+            </a:r>
+          </a:p>
+        </p:txBody>
+      </p:sp>
+      <p:sp>
+        <p:nvSpPr>
+          <p:cNvPr id="6" name="TextBox 5">
+            <a:extLst>
+              <a:ext uri="{FF2B5EF4-FFF2-40B4-BE49-F238E27FC236}">
+                <a16:creationId xmlns:a16="http://schemas.microsoft.com/office/drawing/2014/main" id="{E55792C5-B36D-7640-B366-74942A2876C7}"/>
+              </a:ext>
+            </a:extLst>
+          </p:cNvPr>
+          <p:cNvSpPr txBox="1"/>
+          <p:nvPr/>
+        </p:nvSpPr>
+        <p:spPr>
+          <a:xfrm>
+            <a:off x="3868240" y="4039840"/>
+            <a:ext cx="897893" cy="646331"/>
+          </a:xfrm>
+          <a:prstGeom prst="rect">
+            <a:avLst/>
+          </a:prstGeom>
+          <a:solidFill>
+            <a:schemeClr val="accent1"/>
+          </a:solidFill>
+        </p:spPr>
+        <p:style>
+          <a:lnRef idx="2">
+            <a:schemeClr val="accent1"/>
+          </a:lnRef>
+          <a:fillRef idx="1">
+            <a:schemeClr val="lt1"/>
+          </a:fillRef>
+          <a:effectRef idx="0">
+            <a:schemeClr val="accent1"/>
+          </a:effectRef>
+          <a:fontRef idx="minor">
+            <a:schemeClr val="dk1"/>
+          </a:fontRef>
+        </p:style>
+        <p:txBody>
+          <a:bodyPr wrap="square" rtlCol="0">
+            <a:spAutoFit/>
+          </a:bodyPr>
+          <a:lstStyle/>
+          <a:p>
+            <a:pPr algn="ctr"/>
+            <a:r>
+              <a:rPr lang="en-US" dirty="0">
+                <a:solidFill>
+                  <a:schemeClr val="tx1"/>
+                </a:solidFill>
+              </a:rPr>
+              <a:t>BERT LAYER</a:t>
+            </a:r>
+          </a:p>
+        </p:txBody>
+      </p:sp>
+      <p:grpSp>
+        <p:nvGrpSpPr>
+          <p:cNvPr id="7" name="Group 6">
+            <a:extLst>
+              <a:ext uri="{FF2B5EF4-FFF2-40B4-BE49-F238E27FC236}">
+                <a16:creationId xmlns:a16="http://schemas.microsoft.com/office/drawing/2014/main" id="{0C108DB4-C9C1-124C-B59E-046A01CDDCEE}"/>
+              </a:ext>
+            </a:extLst>
+          </p:cNvPr>
+          <p:cNvGrpSpPr/>
+          <p:nvPr/>
+        </p:nvGrpSpPr>
+        <p:grpSpPr>
+          <a:xfrm>
+            <a:off x="3006547" y="3208489"/>
+            <a:ext cx="614175" cy="2308324"/>
+            <a:chOff x="3224400" y="2809876"/>
+            <a:chExt cx="614175" cy="2308324"/>
+          </a:xfrm>
+        </p:grpSpPr>
+        <p:sp>
+          <p:nvSpPr>
+            <p:cNvPr id="8" name="Rectangle 7">
+              <a:extLst>
+                <a:ext uri="{FF2B5EF4-FFF2-40B4-BE49-F238E27FC236}">
+                  <a16:creationId xmlns:a16="http://schemas.microsoft.com/office/drawing/2014/main" id="{AB9314B1-83D2-DC46-AF06-EA1283195333}"/>
+                </a:ext>
+              </a:extLst>
+            </p:cNvPr>
+            <p:cNvSpPr/>
+            <p:nvPr/>
+          </p:nvSpPr>
+          <p:spPr>
+            <a:xfrm>
+              <a:off x="3224400" y="2809876"/>
+              <a:ext cx="614175" cy="2308324"/>
+            </a:xfrm>
+            <a:prstGeom prst="rect">
+              <a:avLst/>
+            </a:prstGeom>
+          </p:spPr>
+          <p:style>
+            <a:lnRef idx="2">
+              <a:schemeClr val="accent1">
+                <a:shade val="50000"/>
+              </a:schemeClr>
+            </a:lnRef>
+            <a:fillRef idx="1">
+              <a:schemeClr val="accent1"/>
+            </a:fillRef>
+            <a:effectRef idx="0">
+              <a:schemeClr val="accent1"/>
+            </a:effectRef>
+            <a:fontRef idx="minor">
+              <a:schemeClr val="lt1"/>
+            </a:fontRef>
+          </p:style>
+          <p:txBody>
+            <a:bodyPr rtlCol="0" anchor="ctr"/>
+            <a:lstStyle/>
+            <a:p>
+              <a:pPr algn="ctr"/>
+              <a:endParaRPr lang="en-US"/>
+            </a:p>
+          </p:txBody>
+        </p:sp>
+        <p:sp>
+          <p:nvSpPr>
+            <p:cNvPr id="9" name="Oval 8">
+              <a:extLst>
+                <a:ext uri="{FF2B5EF4-FFF2-40B4-BE49-F238E27FC236}">
+                  <a16:creationId xmlns:a16="http://schemas.microsoft.com/office/drawing/2014/main" id="{576233A2-08DD-EC4E-AECE-55F6C533B1D5}"/>
+                </a:ext>
+              </a:extLst>
+            </p:cNvPr>
+            <p:cNvSpPr/>
+            <p:nvPr/>
+          </p:nvSpPr>
+          <p:spPr>
+            <a:xfrm>
+              <a:off x="3286793" y="2886972"/>
+              <a:ext cx="485287" cy="485287"/>
+            </a:xfrm>
+            <a:prstGeom prst="ellipse">
+              <a:avLst/>
+            </a:prstGeom>
+            <a:solidFill>
+              <a:schemeClr val="tx1"/>
+            </a:solidFill>
+          </p:spPr>
+          <p:style>
+            <a:lnRef idx="2">
+              <a:schemeClr val="accent1">
+                <a:shade val="50000"/>
+              </a:schemeClr>
+            </a:lnRef>
+            <a:fillRef idx="1">
+              <a:schemeClr val="accent1"/>
+            </a:fillRef>
+            <a:effectRef idx="0">
+              <a:schemeClr val="accent1"/>
+            </a:effectRef>
+            <a:fontRef idx="minor">
+              <a:schemeClr val="lt1"/>
+            </a:fontRef>
+          </p:style>
+          <p:txBody>
+            <a:bodyPr rtlCol="0" anchor="ctr"/>
+            <a:lstStyle/>
+            <a:p>
+              <a:pPr algn="ctr"/>
+              <a:endParaRPr lang="en-US"/>
+            </a:p>
+          </p:txBody>
+        </p:sp>
+        <p:sp>
+          <p:nvSpPr>
+            <p:cNvPr id="10" name="Oval 9">
+              <a:extLst>
+                <a:ext uri="{FF2B5EF4-FFF2-40B4-BE49-F238E27FC236}">
+                  <a16:creationId xmlns:a16="http://schemas.microsoft.com/office/drawing/2014/main" id="{DF0A40A2-2E19-E44A-9B21-FD2E30CD393F}"/>
+                </a:ext>
+              </a:extLst>
+            </p:cNvPr>
+            <p:cNvSpPr/>
+            <p:nvPr/>
+          </p:nvSpPr>
+          <p:spPr>
+            <a:xfrm>
+              <a:off x="3286792" y="4511059"/>
+              <a:ext cx="485287" cy="485287"/>
+            </a:xfrm>
+            <a:prstGeom prst="ellipse">
+              <a:avLst/>
+            </a:prstGeom>
+            <a:solidFill>
+              <a:schemeClr val="tx1"/>
+            </a:solidFill>
+          </p:spPr>
+          <p:style>
+            <a:lnRef idx="2">
+              <a:schemeClr val="accent1">
+                <a:shade val="50000"/>
+              </a:schemeClr>
+            </a:lnRef>
+            <a:fillRef idx="1">
+              <a:schemeClr val="accent1"/>
+            </a:fillRef>
+            <a:effectRef idx="0">
+              <a:schemeClr val="accent1"/>
+            </a:effectRef>
+            <a:fontRef idx="minor">
+              <a:schemeClr val="lt1"/>
+            </a:fontRef>
+          </p:style>
+          <p:txBody>
+            <a:bodyPr rtlCol="0" anchor="ctr"/>
+            <a:lstStyle/>
+            <a:p>
+              <a:pPr algn="ctr"/>
+              <a:endParaRPr lang="en-US"/>
+            </a:p>
+          </p:txBody>
+        </p:sp>
+        <p:sp>
+          <p:nvSpPr>
+            <p:cNvPr id="11" name="Oval 10">
+              <a:extLst>
+                <a:ext uri="{FF2B5EF4-FFF2-40B4-BE49-F238E27FC236}">
+                  <a16:creationId xmlns:a16="http://schemas.microsoft.com/office/drawing/2014/main" id="{957ED08B-7D37-8E41-B4EC-4DE04D603A53}"/>
+                </a:ext>
+              </a:extLst>
+            </p:cNvPr>
+            <p:cNvSpPr/>
+            <p:nvPr/>
+          </p:nvSpPr>
+          <p:spPr>
+            <a:xfrm>
+              <a:off x="3286792" y="3964037"/>
+              <a:ext cx="485287" cy="485287"/>
+            </a:xfrm>
+            <a:prstGeom prst="ellipse">
+              <a:avLst/>
+            </a:prstGeom>
+            <a:solidFill>
+              <a:schemeClr val="tx1"/>
+            </a:solidFill>
+          </p:spPr>
+          <p:style>
+            <a:lnRef idx="2">
+              <a:schemeClr val="accent1">
+                <a:shade val="50000"/>
+              </a:schemeClr>
+            </a:lnRef>
+            <a:fillRef idx="1">
+              <a:schemeClr val="accent1"/>
+            </a:fillRef>
+            <a:effectRef idx="0">
+              <a:schemeClr val="accent1"/>
+            </a:effectRef>
+            <a:fontRef idx="minor">
+              <a:schemeClr val="lt1"/>
+            </a:fontRef>
+          </p:style>
+          <p:txBody>
+            <a:bodyPr rtlCol="0" anchor="ctr"/>
+            <a:lstStyle/>
+            <a:p>
+              <a:pPr algn="ctr"/>
+              <a:endParaRPr lang="en-US"/>
+            </a:p>
+          </p:txBody>
+        </p:sp>
+        <p:sp>
+          <p:nvSpPr>
+            <p:cNvPr id="12" name="Oval 11">
+              <a:extLst>
+                <a:ext uri="{FF2B5EF4-FFF2-40B4-BE49-F238E27FC236}">
+                  <a16:creationId xmlns:a16="http://schemas.microsoft.com/office/drawing/2014/main" id="{6D3439C5-F08C-5946-9ADB-CA0230D3906A}"/>
+                </a:ext>
+              </a:extLst>
+            </p:cNvPr>
+            <p:cNvSpPr/>
+            <p:nvPr/>
+          </p:nvSpPr>
+          <p:spPr>
+            <a:xfrm>
+              <a:off x="3286792" y="3433994"/>
+              <a:ext cx="485287" cy="485287"/>
+            </a:xfrm>
+            <a:prstGeom prst="ellipse">
+              <a:avLst/>
+            </a:prstGeom>
+            <a:solidFill>
+              <a:schemeClr val="tx1"/>
+            </a:solidFill>
+          </p:spPr>
+          <p:style>
+            <a:lnRef idx="2">
+              <a:schemeClr val="accent1">
+                <a:shade val="50000"/>
+              </a:schemeClr>
+            </a:lnRef>
+            <a:fillRef idx="1">
+              <a:schemeClr val="accent1"/>
+            </a:fillRef>
+            <a:effectRef idx="0">
+              <a:schemeClr val="accent1"/>
+            </a:effectRef>
+            <a:fontRef idx="minor">
+              <a:schemeClr val="lt1"/>
+            </a:fontRef>
+          </p:style>
+          <p:txBody>
+            <a:bodyPr rtlCol="0" anchor="ctr"/>
+            <a:lstStyle/>
+            <a:p>
+              <a:pPr algn="ctr"/>
+              <a:endParaRPr lang="en-US"/>
+            </a:p>
+          </p:txBody>
+        </p:sp>
+      </p:grpSp>
+      <p:sp>
+        <p:nvSpPr>
+          <p:cNvPr id="13" name="TextBox 12">
+            <a:extLst>
+              <a:ext uri="{FF2B5EF4-FFF2-40B4-BE49-F238E27FC236}">
+                <a16:creationId xmlns:a16="http://schemas.microsoft.com/office/drawing/2014/main" id="{E13465B2-C15F-2845-86E6-BBE864D2A9B8}"/>
+              </a:ext>
+            </a:extLst>
+          </p:cNvPr>
+          <p:cNvSpPr txBox="1"/>
+          <p:nvPr/>
+        </p:nvSpPr>
+        <p:spPr>
+          <a:xfrm rot="5400000">
+            <a:off x="4629810" y="4041553"/>
+            <a:ext cx="1394686" cy="646331"/>
+          </a:xfrm>
+          <a:prstGeom prst="rect">
+            <a:avLst/>
+          </a:prstGeom>
+          <a:solidFill>
+            <a:schemeClr val="accent1"/>
+          </a:solidFill>
+        </p:spPr>
+        <p:style>
+          <a:lnRef idx="2">
+            <a:schemeClr val="accent1"/>
+          </a:lnRef>
+          <a:fillRef idx="1">
+            <a:schemeClr val="lt1"/>
+          </a:fillRef>
+          <a:effectRef idx="0">
+            <a:schemeClr val="accent1"/>
+          </a:effectRef>
+          <a:fontRef idx="minor">
+            <a:schemeClr val="dk1"/>
+          </a:fontRef>
+        </p:style>
+        <p:txBody>
+          <a:bodyPr wrap="square" rtlCol="0">
+            <a:spAutoFit/>
+          </a:bodyPr>
+          <a:lstStyle/>
+          <a:p>
+            <a:pPr algn="ctr"/>
+            <a:r>
+              <a:rPr lang="en-US" dirty="0">
+                <a:solidFill>
+                  <a:schemeClr val="tx1"/>
+                </a:solidFill>
+              </a:rPr>
+              <a:t>Pooled CLS Token</a:t>
+            </a:r>
+          </a:p>
+        </p:txBody>
+      </p:sp>
+      <p:sp>
+        <p:nvSpPr>
+          <p:cNvPr id="14" name="TextBox 13">
+            <a:extLst>
+              <a:ext uri="{FF2B5EF4-FFF2-40B4-BE49-F238E27FC236}">
+                <a16:creationId xmlns:a16="http://schemas.microsoft.com/office/drawing/2014/main" id="{581F0AFA-7A45-5D4A-9EA9-D7731C51DBC2}"/>
+              </a:ext>
+            </a:extLst>
+          </p:cNvPr>
+          <p:cNvSpPr txBox="1"/>
+          <p:nvPr/>
+        </p:nvSpPr>
+        <p:spPr>
+          <a:xfrm rot="5400000">
+            <a:off x="5383055" y="4180053"/>
+            <a:ext cx="1394686" cy="369332"/>
+          </a:xfrm>
+          <a:prstGeom prst="rect">
+            <a:avLst/>
+          </a:prstGeom>
+          <a:solidFill>
+            <a:schemeClr val="accent1"/>
+          </a:solidFill>
+        </p:spPr>
+        <p:style>
+          <a:lnRef idx="2">
+            <a:schemeClr val="accent1"/>
+          </a:lnRef>
+          <a:fillRef idx="1">
+            <a:schemeClr val="lt1"/>
+          </a:fillRef>
+          <a:effectRef idx="0">
+            <a:schemeClr val="accent1"/>
+          </a:effectRef>
+          <a:fontRef idx="minor">
+            <a:schemeClr val="dk1"/>
+          </a:fontRef>
+        </p:style>
+        <p:txBody>
+          <a:bodyPr wrap="square" rtlCol="0">
+            <a:spAutoFit/>
+          </a:bodyPr>
+          <a:lstStyle/>
+          <a:p>
+            <a:pPr algn="ctr"/>
+            <a:r>
+              <a:rPr lang="en-US" dirty="0">
+                <a:solidFill>
+                  <a:schemeClr val="tx1"/>
+                </a:solidFill>
+              </a:rPr>
+              <a:t>Linear</a:t>
+            </a:r>
+          </a:p>
+        </p:txBody>
+      </p:sp>
+      <p:sp>
+        <p:nvSpPr>
+          <p:cNvPr id="15" name="TextBox 14">
+            <a:extLst>
+              <a:ext uri="{FF2B5EF4-FFF2-40B4-BE49-F238E27FC236}">
+                <a16:creationId xmlns:a16="http://schemas.microsoft.com/office/drawing/2014/main" id="{B927EC38-C63B-874F-9F17-882BE50CAD84}"/>
+              </a:ext>
+            </a:extLst>
+          </p:cNvPr>
+          <p:cNvSpPr txBox="1"/>
+          <p:nvPr/>
+        </p:nvSpPr>
+        <p:spPr>
+          <a:xfrm rot="5400000">
+            <a:off x="5993163" y="4180052"/>
+            <a:ext cx="1394686" cy="369332"/>
+          </a:xfrm>
+          <a:prstGeom prst="rect">
+            <a:avLst/>
+          </a:prstGeom>
+          <a:solidFill>
+            <a:schemeClr val="accent1"/>
+          </a:solidFill>
+        </p:spPr>
+        <p:style>
+          <a:lnRef idx="2">
+            <a:schemeClr val="accent1"/>
+          </a:lnRef>
+          <a:fillRef idx="1">
+            <a:schemeClr val="lt1"/>
+          </a:fillRef>
+          <a:effectRef idx="0">
+            <a:schemeClr val="accent1"/>
+          </a:effectRef>
+          <a:fontRef idx="minor">
+            <a:schemeClr val="dk1"/>
+          </a:fontRef>
+        </p:style>
+        <p:txBody>
+          <a:bodyPr wrap="square" rtlCol="0">
+            <a:spAutoFit/>
+          </a:bodyPr>
+          <a:lstStyle/>
+          <a:p>
+            <a:pPr algn="ctr"/>
+            <a:r>
+              <a:rPr lang="en-US" dirty="0">
+                <a:solidFill>
+                  <a:schemeClr val="tx1"/>
+                </a:solidFill>
+              </a:rPr>
+              <a:t>LeakyReLu</a:t>
+            </a:r>
+          </a:p>
+        </p:txBody>
+      </p:sp>
+      <p:sp>
+        <p:nvSpPr>
+          <p:cNvPr id="16" name="TextBox 15">
+            <a:extLst>
+              <a:ext uri="{FF2B5EF4-FFF2-40B4-BE49-F238E27FC236}">
+                <a16:creationId xmlns:a16="http://schemas.microsoft.com/office/drawing/2014/main" id="{D223FBEF-FF61-6842-B7CD-1BC588542605}"/>
+              </a:ext>
+            </a:extLst>
+          </p:cNvPr>
+          <p:cNvSpPr txBox="1"/>
+          <p:nvPr/>
+        </p:nvSpPr>
+        <p:spPr>
+          <a:xfrm rot="5400000">
+            <a:off x="8006197" y="3123550"/>
+            <a:ext cx="1394686" cy="369332"/>
+          </a:xfrm>
+          <a:prstGeom prst="rect">
+            <a:avLst/>
+          </a:prstGeom>
+          <a:solidFill>
+            <a:schemeClr val="accent1"/>
+          </a:solidFill>
+        </p:spPr>
+        <p:style>
+          <a:lnRef idx="2">
+            <a:schemeClr val="accent1"/>
+          </a:lnRef>
+          <a:fillRef idx="1">
+            <a:schemeClr val="lt1"/>
+          </a:fillRef>
+          <a:effectRef idx="0">
+            <a:schemeClr val="accent1"/>
+          </a:effectRef>
+          <a:fontRef idx="minor">
+            <a:schemeClr val="dk1"/>
+          </a:fontRef>
+        </p:style>
+        <p:txBody>
+          <a:bodyPr wrap="square" rtlCol="0">
+            <a:spAutoFit/>
+          </a:bodyPr>
+          <a:lstStyle/>
+          <a:p>
+            <a:pPr algn="ctr"/>
+            <a:r>
+              <a:rPr lang="en-US" dirty="0">
+                <a:solidFill>
+                  <a:schemeClr val="tx1"/>
+                </a:solidFill>
+              </a:rPr>
+              <a:t>Linear</a:t>
+            </a:r>
+          </a:p>
+        </p:txBody>
+      </p:sp>
+      <p:sp>
+        <p:nvSpPr>
+          <p:cNvPr id="17" name="TextBox 16">
+            <a:extLst>
+              <a:ext uri="{FF2B5EF4-FFF2-40B4-BE49-F238E27FC236}">
+                <a16:creationId xmlns:a16="http://schemas.microsoft.com/office/drawing/2014/main" id="{BE4C27FF-6844-094B-B070-562DFF2E1BB8}"/>
+              </a:ext>
+            </a:extLst>
+          </p:cNvPr>
+          <p:cNvSpPr txBox="1"/>
+          <p:nvPr/>
+        </p:nvSpPr>
+        <p:spPr>
+          <a:xfrm rot="5400000">
+            <a:off x="8692673" y="3123550"/>
+            <a:ext cx="1394686" cy="369332"/>
+          </a:xfrm>
+          <a:prstGeom prst="rect">
+            <a:avLst/>
+          </a:prstGeom>
+          <a:solidFill>
+            <a:schemeClr val="accent1"/>
+          </a:solidFill>
+        </p:spPr>
+        <p:style>
+          <a:lnRef idx="2">
+            <a:schemeClr val="accent1"/>
+          </a:lnRef>
+          <a:fillRef idx="1">
+            <a:schemeClr val="lt1"/>
+          </a:fillRef>
+          <a:effectRef idx="0">
+            <a:schemeClr val="accent1"/>
+          </a:effectRef>
+          <a:fontRef idx="minor">
+            <a:schemeClr val="dk1"/>
+          </a:fontRef>
+        </p:style>
+        <p:txBody>
+          <a:bodyPr wrap="square" rtlCol="0">
+            <a:spAutoFit/>
+          </a:bodyPr>
+          <a:lstStyle/>
+          <a:p>
+            <a:pPr algn="ctr"/>
+            <a:r>
+              <a:rPr lang="en-US" dirty="0">
+                <a:solidFill>
+                  <a:schemeClr val="tx1"/>
+                </a:solidFill>
+              </a:rPr>
+              <a:t>Softmax</a:t>
+            </a:r>
+          </a:p>
+        </p:txBody>
+      </p:sp>
+      <p:grpSp>
+        <p:nvGrpSpPr>
+          <p:cNvPr id="18" name="Group 17">
+            <a:extLst>
+              <a:ext uri="{FF2B5EF4-FFF2-40B4-BE49-F238E27FC236}">
+                <a16:creationId xmlns:a16="http://schemas.microsoft.com/office/drawing/2014/main" id="{D32083C0-B727-E74D-9855-7C6C235EFAD2}"/>
+              </a:ext>
+            </a:extLst>
+          </p:cNvPr>
+          <p:cNvGrpSpPr/>
+          <p:nvPr/>
+        </p:nvGrpSpPr>
+        <p:grpSpPr>
+          <a:xfrm>
+            <a:off x="7158532" y="3207293"/>
+            <a:ext cx="614175" cy="2308324"/>
+            <a:chOff x="3224400" y="2809876"/>
+            <a:chExt cx="614175" cy="2308324"/>
+          </a:xfrm>
+        </p:grpSpPr>
+        <p:sp>
+          <p:nvSpPr>
+            <p:cNvPr id="19" name="Rectangle 18">
+              <a:extLst>
+                <a:ext uri="{FF2B5EF4-FFF2-40B4-BE49-F238E27FC236}">
+                  <a16:creationId xmlns:a16="http://schemas.microsoft.com/office/drawing/2014/main" id="{B01E84DA-FF62-7C41-9B4F-A30D3EE5747E}"/>
+                </a:ext>
+              </a:extLst>
+            </p:cNvPr>
+            <p:cNvSpPr/>
+            <p:nvPr/>
+          </p:nvSpPr>
+          <p:spPr>
+            <a:xfrm>
+              <a:off x="3224400" y="2809876"/>
+              <a:ext cx="614175" cy="2308324"/>
+            </a:xfrm>
+            <a:prstGeom prst="rect">
+              <a:avLst/>
+            </a:prstGeom>
+          </p:spPr>
+          <p:style>
+            <a:lnRef idx="2">
+              <a:schemeClr val="accent1">
+                <a:shade val="50000"/>
+              </a:schemeClr>
+            </a:lnRef>
+            <a:fillRef idx="1">
+              <a:schemeClr val="accent1"/>
+            </a:fillRef>
+            <a:effectRef idx="0">
+              <a:schemeClr val="accent1"/>
+            </a:effectRef>
+            <a:fontRef idx="minor">
+              <a:schemeClr val="lt1"/>
+            </a:fontRef>
+          </p:style>
+          <p:txBody>
+            <a:bodyPr rtlCol="0" anchor="ctr"/>
+            <a:lstStyle/>
+            <a:p>
+              <a:pPr algn="ctr"/>
+              <a:endParaRPr lang="en-US"/>
+            </a:p>
+          </p:txBody>
+        </p:sp>
+        <p:sp>
+          <p:nvSpPr>
+            <p:cNvPr id="20" name="Oval 19">
+              <a:extLst>
+                <a:ext uri="{FF2B5EF4-FFF2-40B4-BE49-F238E27FC236}">
+                  <a16:creationId xmlns:a16="http://schemas.microsoft.com/office/drawing/2014/main" id="{48DA011D-8DBF-FD45-AD23-4F6A4647EC0E}"/>
+                </a:ext>
+              </a:extLst>
+            </p:cNvPr>
+            <p:cNvSpPr/>
+            <p:nvPr/>
+          </p:nvSpPr>
+          <p:spPr>
+            <a:xfrm>
+              <a:off x="3286793" y="2886972"/>
+              <a:ext cx="485287" cy="485287"/>
+            </a:xfrm>
+            <a:prstGeom prst="ellipse">
+              <a:avLst/>
+            </a:prstGeom>
+            <a:solidFill>
+              <a:schemeClr val="tx1"/>
+            </a:solidFill>
+          </p:spPr>
+          <p:style>
+            <a:lnRef idx="2">
+              <a:schemeClr val="accent1">
+                <a:shade val="50000"/>
+              </a:schemeClr>
+            </a:lnRef>
+            <a:fillRef idx="1">
+              <a:schemeClr val="accent1"/>
+            </a:fillRef>
+            <a:effectRef idx="0">
+              <a:schemeClr val="accent1"/>
+            </a:effectRef>
+            <a:fontRef idx="minor">
+              <a:schemeClr val="lt1"/>
+            </a:fontRef>
+          </p:style>
+          <p:txBody>
+            <a:bodyPr rtlCol="0" anchor="ctr"/>
+            <a:lstStyle/>
+            <a:p>
+              <a:pPr algn="ctr"/>
+              <a:endParaRPr lang="en-US"/>
+            </a:p>
+          </p:txBody>
+        </p:sp>
+        <p:sp>
+          <p:nvSpPr>
+            <p:cNvPr id="21" name="Oval 20">
+              <a:extLst>
+                <a:ext uri="{FF2B5EF4-FFF2-40B4-BE49-F238E27FC236}">
+                  <a16:creationId xmlns:a16="http://schemas.microsoft.com/office/drawing/2014/main" id="{6A514E97-756E-054A-BCF8-B762CC9E88A1}"/>
+                </a:ext>
+              </a:extLst>
+            </p:cNvPr>
+            <p:cNvSpPr/>
+            <p:nvPr/>
+          </p:nvSpPr>
+          <p:spPr>
+            <a:xfrm>
+              <a:off x="3286792" y="4511059"/>
+              <a:ext cx="485287" cy="485287"/>
+            </a:xfrm>
+            <a:prstGeom prst="ellipse">
+              <a:avLst/>
+            </a:prstGeom>
+            <a:solidFill>
+              <a:schemeClr val="tx1"/>
+            </a:solidFill>
+          </p:spPr>
+          <p:style>
+            <a:lnRef idx="2">
+              <a:schemeClr val="accent1">
+                <a:shade val="50000"/>
+              </a:schemeClr>
+            </a:lnRef>
+            <a:fillRef idx="1">
+              <a:schemeClr val="accent1"/>
+            </a:fillRef>
+            <a:effectRef idx="0">
+              <a:schemeClr val="accent1"/>
+            </a:effectRef>
+            <a:fontRef idx="minor">
+              <a:schemeClr val="lt1"/>
+            </a:fontRef>
+          </p:style>
+          <p:txBody>
+            <a:bodyPr rtlCol="0" anchor="ctr"/>
+            <a:lstStyle/>
+            <a:p>
+              <a:pPr algn="ctr"/>
+              <a:endParaRPr lang="en-US"/>
+            </a:p>
+          </p:txBody>
+        </p:sp>
+        <p:sp>
+          <p:nvSpPr>
+            <p:cNvPr id="22" name="Oval 21">
+              <a:extLst>
+                <a:ext uri="{FF2B5EF4-FFF2-40B4-BE49-F238E27FC236}">
+                  <a16:creationId xmlns:a16="http://schemas.microsoft.com/office/drawing/2014/main" id="{F27098C3-AA72-FD40-82CF-388CD44B86AC}"/>
+                </a:ext>
+              </a:extLst>
+            </p:cNvPr>
+            <p:cNvSpPr/>
+            <p:nvPr/>
+          </p:nvSpPr>
+          <p:spPr>
+            <a:xfrm>
+              <a:off x="3286792" y="3964037"/>
+              <a:ext cx="485287" cy="485287"/>
+            </a:xfrm>
+            <a:prstGeom prst="ellipse">
+              <a:avLst/>
+            </a:prstGeom>
+            <a:solidFill>
+              <a:schemeClr val="tx1"/>
+            </a:solidFill>
+          </p:spPr>
+          <p:style>
+            <a:lnRef idx="2">
+              <a:schemeClr val="accent1">
+                <a:shade val="50000"/>
+              </a:schemeClr>
+            </a:lnRef>
+            <a:fillRef idx="1">
+              <a:schemeClr val="accent1"/>
+            </a:fillRef>
+            <a:effectRef idx="0">
+              <a:schemeClr val="accent1"/>
+            </a:effectRef>
+            <a:fontRef idx="minor">
+              <a:schemeClr val="lt1"/>
+            </a:fontRef>
+          </p:style>
+          <p:txBody>
+            <a:bodyPr rtlCol="0" anchor="ctr"/>
+            <a:lstStyle/>
+            <a:p>
+              <a:pPr algn="ctr"/>
+              <a:endParaRPr lang="en-US"/>
+            </a:p>
+          </p:txBody>
+        </p:sp>
+        <p:sp>
+          <p:nvSpPr>
+            <p:cNvPr id="23" name="Oval 22">
+              <a:extLst>
+                <a:ext uri="{FF2B5EF4-FFF2-40B4-BE49-F238E27FC236}">
+                  <a16:creationId xmlns:a16="http://schemas.microsoft.com/office/drawing/2014/main" id="{6BD3866B-436F-8047-BF55-8698EC4CD1E2}"/>
+                </a:ext>
+              </a:extLst>
+            </p:cNvPr>
+            <p:cNvSpPr/>
+            <p:nvPr/>
+          </p:nvSpPr>
+          <p:spPr>
+            <a:xfrm>
+              <a:off x="3286792" y="3433994"/>
+              <a:ext cx="485287" cy="485287"/>
+            </a:xfrm>
+            <a:prstGeom prst="ellipse">
+              <a:avLst/>
+            </a:prstGeom>
+            <a:solidFill>
+              <a:schemeClr val="tx1"/>
+            </a:solidFill>
+          </p:spPr>
+          <p:style>
+            <a:lnRef idx="2">
+              <a:schemeClr val="accent1">
+                <a:shade val="50000"/>
+              </a:schemeClr>
+            </a:lnRef>
+            <a:fillRef idx="1">
+              <a:schemeClr val="accent1"/>
+            </a:fillRef>
+            <a:effectRef idx="0">
+              <a:schemeClr val="accent1"/>
+            </a:effectRef>
+            <a:fontRef idx="minor">
+              <a:schemeClr val="lt1"/>
+            </a:fontRef>
+          </p:style>
+          <p:txBody>
+            <a:bodyPr rtlCol="0" anchor="ctr"/>
+            <a:lstStyle/>
+            <a:p>
+              <a:pPr algn="ctr"/>
+              <a:endParaRPr lang="en-US"/>
+            </a:p>
+          </p:txBody>
+        </p:sp>
+      </p:grpSp>
+      <p:grpSp>
+        <p:nvGrpSpPr>
+          <p:cNvPr id="24" name="Group 23">
+            <a:extLst>
+              <a:ext uri="{FF2B5EF4-FFF2-40B4-BE49-F238E27FC236}">
+                <a16:creationId xmlns:a16="http://schemas.microsoft.com/office/drawing/2014/main" id="{70B5D9CF-9DBA-EC4E-A817-382C122C1F61}"/>
+              </a:ext>
+            </a:extLst>
+          </p:cNvPr>
+          <p:cNvGrpSpPr/>
+          <p:nvPr/>
+        </p:nvGrpSpPr>
+        <p:grpSpPr>
+          <a:xfrm>
+            <a:off x="10345482" y="2873637"/>
+            <a:ext cx="539151" cy="869158"/>
+            <a:chOff x="8402177" y="2827316"/>
+            <a:chExt cx="692149" cy="1287484"/>
+          </a:xfrm>
+        </p:grpSpPr>
+        <p:sp>
+          <p:nvSpPr>
+            <p:cNvPr id="25" name="Rectangle 24">
+              <a:extLst>
+                <a:ext uri="{FF2B5EF4-FFF2-40B4-BE49-F238E27FC236}">
+                  <a16:creationId xmlns:a16="http://schemas.microsoft.com/office/drawing/2014/main" id="{D6462F30-4510-FC46-97BF-2D989A50A951}"/>
+                </a:ext>
+              </a:extLst>
+            </p:cNvPr>
+            <p:cNvSpPr/>
+            <p:nvPr/>
+          </p:nvSpPr>
+          <p:spPr>
+            <a:xfrm>
+              <a:off x="8402177" y="2827316"/>
+              <a:ext cx="692149" cy="1287484"/>
+            </a:xfrm>
+            <a:prstGeom prst="rect">
+              <a:avLst/>
+            </a:prstGeom>
+          </p:spPr>
+          <p:style>
+            <a:lnRef idx="2">
+              <a:schemeClr val="accent1">
+                <a:shade val="50000"/>
+              </a:schemeClr>
+            </a:lnRef>
+            <a:fillRef idx="1">
+              <a:schemeClr val="accent1"/>
+            </a:fillRef>
+            <a:effectRef idx="0">
+              <a:schemeClr val="accent1"/>
+            </a:effectRef>
+            <a:fontRef idx="minor">
+              <a:schemeClr val="lt1"/>
+            </a:fontRef>
+          </p:style>
+          <p:txBody>
+            <a:bodyPr rtlCol="0" anchor="ctr"/>
+            <a:lstStyle/>
+            <a:p>
+              <a:pPr algn="ctr"/>
+              <a:endParaRPr lang="en-US"/>
+            </a:p>
+          </p:txBody>
+        </p:sp>
+        <p:sp>
+          <p:nvSpPr>
+            <p:cNvPr id="26" name="Triangle 25">
+              <a:extLst>
+                <a:ext uri="{FF2B5EF4-FFF2-40B4-BE49-F238E27FC236}">
+                  <a16:creationId xmlns:a16="http://schemas.microsoft.com/office/drawing/2014/main" id="{F45E7041-52BB-9048-81D0-14FB9C396861}"/>
+                </a:ext>
+              </a:extLst>
+            </p:cNvPr>
+            <p:cNvSpPr/>
+            <p:nvPr/>
+          </p:nvSpPr>
+          <p:spPr>
+            <a:xfrm>
+              <a:off x="8476152" y="2911145"/>
+              <a:ext cx="562933" cy="485287"/>
+            </a:xfrm>
+            <a:prstGeom prst="triangle">
+              <a:avLst/>
+            </a:prstGeom>
+            <a:solidFill>
+              <a:schemeClr val="accent2"/>
+            </a:solidFill>
+          </p:spPr>
+          <p:style>
+            <a:lnRef idx="2">
+              <a:schemeClr val="accent1">
+                <a:shade val="50000"/>
+              </a:schemeClr>
+            </a:lnRef>
+            <a:fillRef idx="1">
+              <a:schemeClr val="accent1"/>
+            </a:fillRef>
+            <a:effectRef idx="0">
+              <a:schemeClr val="accent1"/>
+            </a:effectRef>
+            <a:fontRef idx="minor">
+              <a:schemeClr val="lt1"/>
+            </a:fontRef>
+          </p:style>
+          <p:txBody>
+            <a:bodyPr rtlCol="0" anchor="ctr"/>
+            <a:lstStyle/>
+            <a:p>
+              <a:pPr algn="ctr"/>
+              <a:endParaRPr lang="en-US"/>
+            </a:p>
+          </p:txBody>
+        </p:sp>
+        <p:sp>
+          <p:nvSpPr>
+            <p:cNvPr id="27" name="Triangle 26">
+              <a:extLst>
+                <a:ext uri="{FF2B5EF4-FFF2-40B4-BE49-F238E27FC236}">
+                  <a16:creationId xmlns:a16="http://schemas.microsoft.com/office/drawing/2014/main" id="{AD81C5AA-7F2A-BF40-9A72-5CC9374DE3A5}"/>
+                </a:ext>
+              </a:extLst>
+            </p:cNvPr>
+            <p:cNvSpPr/>
+            <p:nvPr/>
+          </p:nvSpPr>
+          <p:spPr>
+            <a:xfrm rot="10800000">
+              <a:off x="8462587" y="3555566"/>
+              <a:ext cx="562933" cy="485287"/>
+            </a:xfrm>
+            <a:prstGeom prst="triangle">
+              <a:avLst/>
+            </a:prstGeom>
+            <a:solidFill>
+              <a:schemeClr val="accent6"/>
+            </a:solidFill>
+          </p:spPr>
+          <p:style>
+            <a:lnRef idx="2">
+              <a:schemeClr val="accent1">
+                <a:shade val="50000"/>
+              </a:schemeClr>
+            </a:lnRef>
+            <a:fillRef idx="1">
+              <a:schemeClr val="accent1"/>
+            </a:fillRef>
+            <a:effectRef idx="0">
+              <a:schemeClr val="accent1"/>
+            </a:effectRef>
+            <a:fontRef idx="minor">
+              <a:schemeClr val="lt1"/>
+            </a:fontRef>
+          </p:style>
+          <p:txBody>
+            <a:bodyPr rtlCol="0" anchor="ctr"/>
+            <a:lstStyle/>
+            <a:p>
+              <a:pPr algn="ctr"/>
+              <a:endParaRPr lang="en-US"/>
+            </a:p>
+          </p:txBody>
+        </p:sp>
+      </p:grpSp>
+      <p:sp>
+        <p:nvSpPr>
+          <p:cNvPr id="28" name="TextBox 27">
+            <a:extLst>
+              <a:ext uri="{FF2B5EF4-FFF2-40B4-BE49-F238E27FC236}">
+                <a16:creationId xmlns:a16="http://schemas.microsoft.com/office/drawing/2014/main" id="{BB271827-AAE2-0F41-9828-762609F3338B}"/>
+              </a:ext>
+            </a:extLst>
+          </p:cNvPr>
+          <p:cNvSpPr txBox="1"/>
+          <p:nvPr/>
+        </p:nvSpPr>
+        <p:spPr>
+          <a:xfrm rot="5400000">
+            <a:off x="7997565" y="5195837"/>
+            <a:ext cx="1394686" cy="369332"/>
+          </a:xfrm>
+          <a:prstGeom prst="rect">
+            <a:avLst/>
+          </a:prstGeom>
+          <a:solidFill>
+            <a:schemeClr val="accent1"/>
+          </a:solidFill>
+        </p:spPr>
+        <p:style>
+          <a:lnRef idx="2">
+            <a:schemeClr val="accent1"/>
+          </a:lnRef>
+          <a:fillRef idx="1">
+            <a:schemeClr val="lt1"/>
+          </a:fillRef>
+          <a:effectRef idx="0">
+            <a:schemeClr val="accent1"/>
+          </a:effectRef>
+          <a:fontRef idx="minor">
+            <a:schemeClr val="dk1"/>
+          </a:fontRef>
+        </p:style>
+        <p:txBody>
+          <a:bodyPr wrap="square" rtlCol="0">
+            <a:spAutoFit/>
+          </a:bodyPr>
+          <a:lstStyle/>
+          <a:p>
+            <a:pPr algn="ctr"/>
+            <a:r>
+              <a:rPr lang="en-US" dirty="0">
+                <a:solidFill>
+                  <a:schemeClr val="tx1"/>
+                </a:solidFill>
+              </a:rPr>
+              <a:t>Linear</a:t>
+            </a:r>
+          </a:p>
+        </p:txBody>
+      </p:sp>
+      <p:sp>
+        <p:nvSpPr>
+          <p:cNvPr id="29" name="TextBox 28">
+            <a:extLst>
+              <a:ext uri="{FF2B5EF4-FFF2-40B4-BE49-F238E27FC236}">
+                <a16:creationId xmlns:a16="http://schemas.microsoft.com/office/drawing/2014/main" id="{9D1E87D3-9B2D-3A47-803C-A5A6BE47C461}"/>
+              </a:ext>
+            </a:extLst>
+          </p:cNvPr>
+          <p:cNvSpPr txBox="1"/>
+          <p:nvPr/>
+        </p:nvSpPr>
+        <p:spPr>
+          <a:xfrm rot="5400000">
+            <a:off x="8684041" y="5200686"/>
+            <a:ext cx="1394686" cy="369332"/>
+          </a:xfrm>
+          <a:prstGeom prst="rect">
+            <a:avLst/>
+          </a:prstGeom>
+          <a:solidFill>
+            <a:schemeClr val="accent1"/>
+          </a:solidFill>
+        </p:spPr>
+        <p:style>
+          <a:lnRef idx="2">
+            <a:schemeClr val="accent1"/>
+          </a:lnRef>
+          <a:fillRef idx="1">
+            <a:schemeClr val="lt1"/>
+          </a:fillRef>
+          <a:effectRef idx="0">
+            <a:schemeClr val="accent1"/>
+          </a:effectRef>
+          <a:fontRef idx="minor">
+            <a:schemeClr val="dk1"/>
+          </a:fontRef>
+        </p:style>
+        <p:txBody>
+          <a:bodyPr wrap="square" rtlCol="0">
+            <a:spAutoFit/>
+          </a:bodyPr>
+          <a:lstStyle/>
+          <a:p>
+            <a:pPr algn="ctr"/>
+            <a:r>
+              <a:rPr lang="en-US" dirty="0">
+                <a:solidFill>
+                  <a:schemeClr val="tx1"/>
+                </a:solidFill>
+              </a:rPr>
+              <a:t>Softmax</a:t>
+            </a:r>
+          </a:p>
+        </p:txBody>
+      </p:sp>
+      <p:grpSp>
+        <p:nvGrpSpPr>
+          <p:cNvPr id="30" name="Group 29">
+            <a:extLst>
+              <a:ext uri="{FF2B5EF4-FFF2-40B4-BE49-F238E27FC236}">
+                <a16:creationId xmlns:a16="http://schemas.microsoft.com/office/drawing/2014/main" id="{AFAAF087-6409-8246-8E45-317E7187EB35}"/>
+              </a:ext>
+            </a:extLst>
+          </p:cNvPr>
+          <p:cNvGrpSpPr/>
+          <p:nvPr/>
+        </p:nvGrpSpPr>
+        <p:grpSpPr>
+          <a:xfrm>
+            <a:off x="10333580" y="4406866"/>
+            <a:ext cx="539151" cy="1947274"/>
+            <a:chOff x="11155548" y="3910950"/>
+            <a:chExt cx="692149" cy="2499862"/>
+          </a:xfrm>
+        </p:grpSpPr>
+        <p:sp>
+          <p:nvSpPr>
+            <p:cNvPr id="31" name="Rectangle 30">
+              <a:extLst>
+                <a:ext uri="{FF2B5EF4-FFF2-40B4-BE49-F238E27FC236}">
+                  <a16:creationId xmlns:a16="http://schemas.microsoft.com/office/drawing/2014/main" id="{AF0218F9-7998-8B48-935D-F13D9DF59074}"/>
+                </a:ext>
+              </a:extLst>
+            </p:cNvPr>
+            <p:cNvSpPr/>
+            <p:nvPr/>
+          </p:nvSpPr>
+          <p:spPr>
+            <a:xfrm>
+              <a:off x="11155548" y="3910950"/>
+              <a:ext cx="692149" cy="2499862"/>
+            </a:xfrm>
+            <a:prstGeom prst="rect">
+              <a:avLst/>
+            </a:prstGeom>
+          </p:spPr>
+          <p:style>
+            <a:lnRef idx="2">
+              <a:schemeClr val="accent1">
+                <a:shade val="50000"/>
+              </a:schemeClr>
+            </a:lnRef>
+            <a:fillRef idx="1">
+              <a:schemeClr val="accent1"/>
+            </a:fillRef>
+            <a:effectRef idx="0">
+              <a:schemeClr val="accent1"/>
+            </a:effectRef>
+            <a:fontRef idx="minor">
+              <a:schemeClr val="lt1"/>
+            </a:fontRef>
+          </p:style>
+          <p:txBody>
+            <a:bodyPr rtlCol="0" anchor="ctr"/>
+            <a:lstStyle/>
+            <a:p>
+              <a:pPr algn="ctr"/>
+              <a:endParaRPr lang="en-US"/>
+            </a:p>
+          </p:txBody>
+        </p:sp>
+        <p:sp>
+          <p:nvSpPr>
+            <p:cNvPr id="32" name="Regular Pentagon 31">
+              <a:extLst>
+                <a:ext uri="{FF2B5EF4-FFF2-40B4-BE49-F238E27FC236}">
+                  <a16:creationId xmlns:a16="http://schemas.microsoft.com/office/drawing/2014/main" id="{C43866EA-FD26-A84A-8341-B6BD57584DCB}"/>
+                </a:ext>
+              </a:extLst>
+            </p:cNvPr>
+            <p:cNvSpPr/>
+            <p:nvPr/>
+          </p:nvSpPr>
+          <p:spPr>
+            <a:xfrm>
+              <a:off x="11232929" y="3986677"/>
+              <a:ext cx="537386" cy="511796"/>
+            </a:xfrm>
+            <a:prstGeom prst="pentagon">
+              <a:avLst/>
+            </a:prstGeom>
+            <a:solidFill>
+              <a:schemeClr val="accent5"/>
+            </a:solidFill>
+          </p:spPr>
+          <p:style>
+            <a:lnRef idx="2">
+              <a:schemeClr val="accent1">
+                <a:shade val="50000"/>
+              </a:schemeClr>
+            </a:lnRef>
+            <a:fillRef idx="1">
+              <a:schemeClr val="accent1"/>
+            </a:fillRef>
+            <a:effectRef idx="0">
+              <a:schemeClr val="accent1"/>
+            </a:effectRef>
+            <a:fontRef idx="minor">
+              <a:schemeClr val="lt1"/>
+            </a:fontRef>
+          </p:style>
+          <p:txBody>
+            <a:bodyPr rtlCol="0" anchor="ctr"/>
+            <a:lstStyle/>
+            <a:p>
+              <a:pPr algn="ctr"/>
+              <a:endParaRPr lang="en-US"/>
+            </a:p>
+          </p:txBody>
+        </p:sp>
+        <p:sp>
+          <p:nvSpPr>
+            <p:cNvPr id="33" name="Regular Pentagon 32">
+              <a:extLst>
+                <a:ext uri="{FF2B5EF4-FFF2-40B4-BE49-F238E27FC236}">
+                  <a16:creationId xmlns:a16="http://schemas.microsoft.com/office/drawing/2014/main" id="{40DD89A7-9549-5B4C-BA99-C39F99044E47}"/>
+                </a:ext>
+              </a:extLst>
+            </p:cNvPr>
+            <p:cNvSpPr/>
+            <p:nvPr/>
+          </p:nvSpPr>
+          <p:spPr>
+            <a:xfrm>
+              <a:off x="11232929" y="4585755"/>
+              <a:ext cx="537386" cy="511796"/>
+            </a:xfrm>
+            <a:prstGeom prst="pentagon">
+              <a:avLst/>
+            </a:prstGeom>
+            <a:solidFill>
+              <a:schemeClr val="accent5"/>
+            </a:solidFill>
+          </p:spPr>
+          <p:style>
+            <a:lnRef idx="2">
+              <a:schemeClr val="accent1">
+                <a:shade val="50000"/>
+              </a:schemeClr>
+            </a:lnRef>
+            <a:fillRef idx="1">
+              <a:schemeClr val="accent1"/>
+            </a:fillRef>
+            <a:effectRef idx="0">
+              <a:schemeClr val="accent1"/>
+            </a:effectRef>
+            <a:fontRef idx="minor">
+              <a:schemeClr val="lt1"/>
+            </a:fontRef>
+          </p:style>
+          <p:txBody>
+            <a:bodyPr rtlCol="0" anchor="ctr"/>
+            <a:lstStyle/>
+            <a:p>
+              <a:pPr algn="ctr"/>
+              <a:endParaRPr lang="en-US"/>
+            </a:p>
+          </p:txBody>
+        </p:sp>
+        <p:sp>
+          <p:nvSpPr>
+            <p:cNvPr id="34" name="Regular Pentagon 33">
+              <a:extLst>
+                <a:ext uri="{FF2B5EF4-FFF2-40B4-BE49-F238E27FC236}">
+                  <a16:creationId xmlns:a16="http://schemas.microsoft.com/office/drawing/2014/main" id="{350F4E21-BE98-9A48-8C6C-478DBA776CEC}"/>
+                </a:ext>
+              </a:extLst>
+            </p:cNvPr>
+            <p:cNvSpPr/>
+            <p:nvPr/>
+          </p:nvSpPr>
+          <p:spPr>
+            <a:xfrm>
+              <a:off x="11245704" y="5213252"/>
+              <a:ext cx="537386" cy="511796"/>
+            </a:xfrm>
+            <a:prstGeom prst="pentagon">
+              <a:avLst/>
+            </a:prstGeom>
+            <a:solidFill>
+              <a:schemeClr val="accent5"/>
+            </a:solidFill>
+          </p:spPr>
+          <p:style>
+            <a:lnRef idx="2">
+              <a:schemeClr val="accent1">
+                <a:shade val="50000"/>
+              </a:schemeClr>
+            </a:lnRef>
+            <a:fillRef idx="1">
+              <a:schemeClr val="accent1"/>
+            </a:fillRef>
+            <a:effectRef idx="0">
+              <a:schemeClr val="accent1"/>
+            </a:effectRef>
+            <a:fontRef idx="minor">
+              <a:schemeClr val="lt1"/>
+            </a:fontRef>
+          </p:style>
+          <p:txBody>
+            <a:bodyPr rtlCol="0" anchor="ctr"/>
+            <a:lstStyle/>
+            <a:p>
+              <a:pPr algn="ctr"/>
+              <a:endParaRPr lang="en-US"/>
+            </a:p>
+          </p:txBody>
+        </p:sp>
+        <p:sp>
+          <p:nvSpPr>
+            <p:cNvPr id="35" name="Regular Pentagon 34">
+              <a:extLst>
+                <a:ext uri="{FF2B5EF4-FFF2-40B4-BE49-F238E27FC236}">
+                  <a16:creationId xmlns:a16="http://schemas.microsoft.com/office/drawing/2014/main" id="{70A83860-4EE4-554C-8E0D-76EB74BDCED6}"/>
+                </a:ext>
+              </a:extLst>
+            </p:cNvPr>
+            <p:cNvSpPr/>
+            <p:nvPr/>
+          </p:nvSpPr>
+          <p:spPr>
+            <a:xfrm>
+              <a:off x="11245704" y="5812032"/>
+              <a:ext cx="537386" cy="511796"/>
+            </a:xfrm>
+            <a:prstGeom prst="pentagon">
+              <a:avLst/>
+            </a:prstGeom>
+            <a:solidFill>
+              <a:schemeClr val="accent5"/>
+            </a:solidFill>
+          </p:spPr>
+          <p:style>
+            <a:lnRef idx="2">
+              <a:schemeClr val="accent1">
+                <a:shade val="50000"/>
+              </a:schemeClr>
+            </a:lnRef>
+            <a:fillRef idx="1">
+              <a:schemeClr val="accent1"/>
+            </a:fillRef>
+            <a:effectRef idx="0">
+              <a:schemeClr val="accent1"/>
+            </a:effectRef>
+            <a:fontRef idx="minor">
+              <a:schemeClr val="lt1"/>
+            </a:fontRef>
+          </p:style>
+          <p:txBody>
+            <a:bodyPr rtlCol="0" anchor="ctr"/>
+            <a:lstStyle/>
+            <a:p>
+              <a:pPr algn="ctr"/>
+              <a:endParaRPr lang="en-US"/>
+            </a:p>
+          </p:txBody>
+        </p:sp>
+      </p:grpSp>
+      <p:cxnSp>
+        <p:nvCxnSpPr>
+          <p:cNvPr id="36" name="Elbow Connector 35">
+            <a:extLst>
+              <a:ext uri="{FF2B5EF4-FFF2-40B4-BE49-F238E27FC236}">
+                <a16:creationId xmlns:a16="http://schemas.microsoft.com/office/drawing/2014/main" id="{44CE24DA-6A2E-BF4D-90FE-38C164A2863E}"/>
+              </a:ext>
+            </a:extLst>
+          </p:cNvPr>
+          <p:cNvCxnSpPr>
+            <a:cxnSpLocks/>
+            <a:stCxn id="19" idx="3"/>
+            <a:endCxn id="16" idx="2"/>
+          </p:cNvCxnSpPr>
+          <p:nvPr/>
+        </p:nvCxnSpPr>
+        <p:spPr>
+          <a:xfrm flipV="1">
+            <a:off x="7772707" y="3308216"/>
+            <a:ext cx="746167" cy="1053239"/>
+          </a:xfrm>
+          <a:prstGeom prst="bentConnector3">
+            <a:avLst/>
+          </a:prstGeom>
+          <a:ln>
+            <a:tailEnd type="triangle"/>
+          </a:ln>
+        </p:spPr>
+        <p:style>
+          <a:lnRef idx="1">
+            <a:schemeClr val="accent1"/>
+          </a:lnRef>
+          <a:fillRef idx="0">
+            <a:schemeClr val="accent1"/>
+          </a:fillRef>
+          <a:effectRef idx="0">
+            <a:schemeClr val="accent1"/>
+          </a:effectRef>
+          <a:fontRef idx="minor">
+            <a:schemeClr val="tx1"/>
+          </a:fontRef>
+        </p:style>
+      </p:cxnSp>
+      <p:cxnSp>
+        <p:nvCxnSpPr>
+          <p:cNvPr id="37" name="Elbow Connector 36">
+            <a:extLst>
+              <a:ext uri="{FF2B5EF4-FFF2-40B4-BE49-F238E27FC236}">
+                <a16:creationId xmlns:a16="http://schemas.microsoft.com/office/drawing/2014/main" id="{19318461-9AF1-3344-A63A-5FD2A398847C}"/>
+              </a:ext>
+            </a:extLst>
+          </p:cNvPr>
+          <p:cNvCxnSpPr>
+            <a:cxnSpLocks/>
+            <a:stCxn id="19" idx="3"/>
+            <a:endCxn id="28" idx="2"/>
+          </p:cNvCxnSpPr>
+          <p:nvPr/>
+        </p:nvCxnSpPr>
+        <p:spPr>
+          <a:xfrm>
+            <a:off x="7772707" y="4361455"/>
+            <a:ext cx="737535" cy="1019048"/>
+          </a:xfrm>
+          <a:prstGeom prst="bentConnector3">
+            <a:avLst>
+              <a:gd name="adj1" fmla="val 50000"/>
+            </a:avLst>
+          </a:prstGeom>
+          <a:ln>
+            <a:tailEnd type="triangle"/>
+          </a:ln>
+        </p:spPr>
+        <p:style>
+          <a:lnRef idx="1">
+            <a:schemeClr val="accent1"/>
+          </a:lnRef>
+          <a:fillRef idx="0">
+            <a:schemeClr val="accent1"/>
+          </a:fillRef>
+          <a:effectRef idx="0">
+            <a:schemeClr val="accent1"/>
+          </a:effectRef>
+          <a:fontRef idx="minor">
+            <a:schemeClr val="tx1"/>
+          </a:fontRef>
+        </p:style>
+      </p:cxnSp>
+      <p:cxnSp>
+        <p:nvCxnSpPr>
+          <p:cNvPr id="38" name="Straight Arrow Connector 37">
+            <a:extLst>
+              <a:ext uri="{FF2B5EF4-FFF2-40B4-BE49-F238E27FC236}">
+                <a16:creationId xmlns:a16="http://schemas.microsoft.com/office/drawing/2014/main" id="{E0523B01-BF90-3240-8F8D-73C40D262ABF}"/>
+              </a:ext>
+            </a:extLst>
+          </p:cNvPr>
+          <p:cNvCxnSpPr>
+            <a:stCxn id="4" idx="3"/>
+            <a:endCxn id="8" idx="1"/>
+          </p:cNvCxnSpPr>
+          <p:nvPr/>
+        </p:nvCxnSpPr>
+        <p:spPr>
+          <a:xfrm>
+            <a:off x="2588815" y="4361455"/>
+            <a:ext cx="417732" cy="1196"/>
+          </a:xfrm>
+          <a:prstGeom prst="straightConnector1">
+            <a:avLst/>
+          </a:prstGeom>
+          <a:ln>
+            <a:tailEnd type="triangle"/>
+          </a:ln>
+        </p:spPr>
+        <p:style>
+          <a:lnRef idx="1">
+            <a:schemeClr val="accent1"/>
+          </a:lnRef>
+          <a:fillRef idx="0">
+            <a:schemeClr val="accent1"/>
+          </a:fillRef>
+          <a:effectRef idx="0">
+            <a:schemeClr val="accent1"/>
+          </a:effectRef>
+          <a:fontRef idx="minor">
+            <a:schemeClr val="tx1"/>
+          </a:fontRef>
+        </p:style>
+      </p:cxnSp>
+      <p:cxnSp>
+        <p:nvCxnSpPr>
+          <p:cNvPr id="39" name="Straight Arrow Connector 38">
+            <a:extLst>
+              <a:ext uri="{FF2B5EF4-FFF2-40B4-BE49-F238E27FC236}">
+                <a16:creationId xmlns:a16="http://schemas.microsoft.com/office/drawing/2014/main" id="{CB267311-75C7-AA4B-81C5-EC2C96814497}"/>
+              </a:ext>
+            </a:extLst>
+          </p:cNvPr>
+          <p:cNvCxnSpPr>
+            <a:cxnSpLocks/>
+            <a:stCxn id="8" idx="3"/>
+            <a:endCxn id="6" idx="1"/>
+          </p:cNvCxnSpPr>
+          <p:nvPr/>
+        </p:nvCxnSpPr>
+        <p:spPr>
+          <a:xfrm>
+            <a:off x="3620722" y="4362651"/>
+            <a:ext cx="247518" cy="355"/>
+          </a:xfrm>
+          <a:prstGeom prst="straightConnector1">
+            <a:avLst/>
+          </a:prstGeom>
+          <a:ln>
+            <a:tailEnd type="triangle"/>
+          </a:ln>
+        </p:spPr>
+        <p:style>
+          <a:lnRef idx="1">
+            <a:schemeClr val="accent1"/>
+          </a:lnRef>
+          <a:fillRef idx="0">
+            <a:schemeClr val="accent1"/>
+          </a:fillRef>
+          <a:effectRef idx="0">
+            <a:schemeClr val="accent1"/>
+          </a:effectRef>
+          <a:fontRef idx="minor">
+            <a:schemeClr val="tx1"/>
+          </a:fontRef>
+        </p:style>
+      </p:cxnSp>
+      <p:cxnSp>
+        <p:nvCxnSpPr>
+          <p:cNvPr id="40" name="Straight Arrow Connector 39">
+            <a:extLst>
+              <a:ext uri="{FF2B5EF4-FFF2-40B4-BE49-F238E27FC236}">
+                <a16:creationId xmlns:a16="http://schemas.microsoft.com/office/drawing/2014/main" id="{6D6F01E2-49AC-194D-A60A-11B6B277CE9C}"/>
+              </a:ext>
+            </a:extLst>
+          </p:cNvPr>
+          <p:cNvCxnSpPr>
+            <a:cxnSpLocks/>
+            <a:stCxn id="6" idx="3"/>
+            <a:endCxn id="13" idx="2"/>
+          </p:cNvCxnSpPr>
+          <p:nvPr/>
+        </p:nvCxnSpPr>
+        <p:spPr>
+          <a:xfrm>
+            <a:off x="4766133" y="4363006"/>
+            <a:ext cx="237855" cy="1713"/>
+          </a:xfrm>
+          <a:prstGeom prst="straightConnector1">
+            <a:avLst/>
+          </a:prstGeom>
+          <a:ln>
+            <a:tailEnd type="triangle"/>
+          </a:ln>
+        </p:spPr>
+        <p:style>
+          <a:lnRef idx="1">
+            <a:schemeClr val="accent1"/>
+          </a:lnRef>
+          <a:fillRef idx="0">
+            <a:schemeClr val="accent1"/>
+          </a:fillRef>
+          <a:effectRef idx="0">
+            <a:schemeClr val="accent1"/>
+          </a:effectRef>
+          <a:fontRef idx="minor">
+            <a:schemeClr val="tx1"/>
+          </a:fontRef>
+        </p:style>
+      </p:cxnSp>
+      <p:cxnSp>
+        <p:nvCxnSpPr>
+          <p:cNvPr id="41" name="Straight Arrow Connector 40">
+            <a:extLst>
+              <a:ext uri="{FF2B5EF4-FFF2-40B4-BE49-F238E27FC236}">
+                <a16:creationId xmlns:a16="http://schemas.microsoft.com/office/drawing/2014/main" id="{0C2AEBDD-D49B-7F4C-8D77-E06D599B3706}"/>
+              </a:ext>
+            </a:extLst>
+          </p:cNvPr>
+          <p:cNvCxnSpPr>
+            <a:cxnSpLocks/>
+            <a:stCxn id="13" idx="0"/>
+            <a:endCxn id="14" idx="2"/>
+          </p:cNvCxnSpPr>
+          <p:nvPr/>
+        </p:nvCxnSpPr>
+        <p:spPr>
+          <a:xfrm>
+            <a:off x="5650319" y="4364719"/>
+            <a:ext cx="245413" cy="0"/>
+          </a:xfrm>
+          <a:prstGeom prst="straightConnector1">
+            <a:avLst/>
+          </a:prstGeom>
+          <a:ln>
+            <a:tailEnd type="triangle"/>
+          </a:ln>
+        </p:spPr>
+        <p:style>
+          <a:lnRef idx="1">
+            <a:schemeClr val="accent1"/>
+          </a:lnRef>
+          <a:fillRef idx="0">
+            <a:schemeClr val="accent1"/>
+          </a:fillRef>
+          <a:effectRef idx="0">
+            <a:schemeClr val="accent1"/>
+          </a:effectRef>
+          <a:fontRef idx="minor">
+            <a:schemeClr val="tx1"/>
+          </a:fontRef>
+        </p:style>
+      </p:cxnSp>
+      <p:cxnSp>
+        <p:nvCxnSpPr>
+          <p:cNvPr id="42" name="Straight Arrow Connector 41">
+            <a:extLst>
+              <a:ext uri="{FF2B5EF4-FFF2-40B4-BE49-F238E27FC236}">
+                <a16:creationId xmlns:a16="http://schemas.microsoft.com/office/drawing/2014/main" id="{AFFB7DE6-322F-9A4E-AC3E-C91D84C2532C}"/>
+              </a:ext>
+            </a:extLst>
+          </p:cNvPr>
+          <p:cNvCxnSpPr>
+            <a:cxnSpLocks/>
+            <a:stCxn id="14" idx="0"/>
+            <a:endCxn id="15" idx="2"/>
+          </p:cNvCxnSpPr>
+          <p:nvPr/>
+        </p:nvCxnSpPr>
+        <p:spPr>
+          <a:xfrm flipV="1">
+            <a:off x="6265064" y="4364718"/>
+            <a:ext cx="240776" cy="1"/>
+          </a:xfrm>
+          <a:prstGeom prst="straightConnector1">
+            <a:avLst/>
+          </a:prstGeom>
+          <a:ln>
+            <a:tailEnd type="triangle"/>
+          </a:ln>
+        </p:spPr>
+        <p:style>
+          <a:lnRef idx="1">
+            <a:schemeClr val="accent1"/>
+          </a:lnRef>
+          <a:fillRef idx="0">
+            <a:schemeClr val="accent1"/>
+          </a:fillRef>
+          <a:effectRef idx="0">
+            <a:schemeClr val="accent1"/>
+          </a:effectRef>
+          <a:fontRef idx="minor">
+            <a:schemeClr val="tx1"/>
+          </a:fontRef>
+        </p:style>
+      </p:cxnSp>
+      <p:cxnSp>
+        <p:nvCxnSpPr>
+          <p:cNvPr id="43" name="Straight Arrow Connector 42">
+            <a:extLst>
+              <a:ext uri="{FF2B5EF4-FFF2-40B4-BE49-F238E27FC236}">
+                <a16:creationId xmlns:a16="http://schemas.microsoft.com/office/drawing/2014/main" id="{C2921A4B-998D-4440-B6FD-5606A3AA36C6}"/>
+              </a:ext>
+            </a:extLst>
+          </p:cNvPr>
+          <p:cNvCxnSpPr>
+            <a:cxnSpLocks/>
+            <a:stCxn id="15" idx="0"/>
+            <a:endCxn id="19" idx="1"/>
+          </p:cNvCxnSpPr>
+          <p:nvPr/>
+        </p:nvCxnSpPr>
+        <p:spPr>
+          <a:xfrm flipV="1">
+            <a:off x="6875172" y="4361455"/>
+            <a:ext cx="283360" cy="3263"/>
+          </a:xfrm>
+          <a:prstGeom prst="straightConnector1">
+            <a:avLst/>
+          </a:prstGeom>
+          <a:ln>
+            <a:tailEnd type="triangle"/>
+          </a:ln>
+        </p:spPr>
+        <p:style>
+          <a:lnRef idx="1">
+            <a:schemeClr val="accent1"/>
+          </a:lnRef>
+          <a:fillRef idx="0">
+            <a:schemeClr val="accent1"/>
+          </a:fillRef>
+          <a:effectRef idx="0">
+            <a:schemeClr val="accent1"/>
+          </a:effectRef>
+          <a:fontRef idx="minor">
+            <a:schemeClr val="tx1"/>
+          </a:fontRef>
+        </p:style>
+      </p:cxnSp>
+      <p:cxnSp>
+        <p:nvCxnSpPr>
+          <p:cNvPr id="44" name="Straight Arrow Connector 43">
+            <a:extLst>
+              <a:ext uri="{FF2B5EF4-FFF2-40B4-BE49-F238E27FC236}">
+                <a16:creationId xmlns:a16="http://schemas.microsoft.com/office/drawing/2014/main" id="{D2140848-D1CB-4143-B413-17A8E4CF18AA}"/>
+              </a:ext>
+            </a:extLst>
+          </p:cNvPr>
+          <p:cNvCxnSpPr>
+            <a:cxnSpLocks/>
+            <a:stCxn id="16" idx="0"/>
+            <a:endCxn id="17" idx="2"/>
+          </p:cNvCxnSpPr>
+          <p:nvPr/>
+        </p:nvCxnSpPr>
+        <p:spPr>
+          <a:xfrm>
+            <a:off x="8888206" y="3308216"/>
+            <a:ext cx="317144" cy="0"/>
+          </a:xfrm>
+          <a:prstGeom prst="straightConnector1">
+            <a:avLst/>
+          </a:prstGeom>
+          <a:ln>
+            <a:tailEnd type="triangle"/>
+          </a:ln>
+        </p:spPr>
+        <p:style>
+          <a:lnRef idx="1">
+            <a:schemeClr val="accent1"/>
+          </a:lnRef>
+          <a:fillRef idx="0">
+            <a:schemeClr val="accent1"/>
+          </a:fillRef>
+          <a:effectRef idx="0">
+            <a:schemeClr val="accent1"/>
+          </a:effectRef>
+          <a:fontRef idx="minor">
+            <a:schemeClr val="tx1"/>
+          </a:fontRef>
+        </p:style>
+      </p:cxnSp>
+      <p:cxnSp>
+        <p:nvCxnSpPr>
+          <p:cNvPr id="45" name="Straight Arrow Connector 44">
+            <a:extLst>
+              <a:ext uri="{FF2B5EF4-FFF2-40B4-BE49-F238E27FC236}">
+                <a16:creationId xmlns:a16="http://schemas.microsoft.com/office/drawing/2014/main" id="{ECE7E44B-D17E-2441-B052-E9E19A02C9EE}"/>
+              </a:ext>
+            </a:extLst>
+          </p:cNvPr>
+          <p:cNvCxnSpPr>
+            <a:cxnSpLocks/>
+            <a:stCxn id="17" idx="0"/>
+            <a:endCxn id="25" idx="1"/>
+          </p:cNvCxnSpPr>
+          <p:nvPr/>
+        </p:nvCxnSpPr>
+        <p:spPr>
+          <a:xfrm>
+            <a:off x="9574682" y="3308216"/>
+            <a:ext cx="770800" cy="0"/>
+          </a:xfrm>
+          <a:prstGeom prst="straightConnector1">
+            <a:avLst/>
+          </a:prstGeom>
+          <a:ln>
+            <a:tailEnd type="triangle"/>
+          </a:ln>
+        </p:spPr>
+        <p:style>
+          <a:lnRef idx="1">
+            <a:schemeClr val="accent1"/>
+          </a:lnRef>
+          <a:fillRef idx="0">
+            <a:schemeClr val="accent1"/>
+          </a:fillRef>
+          <a:effectRef idx="0">
+            <a:schemeClr val="accent1"/>
+          </a:effectRef>
+          <a:fontRef idx="minor">
+            <a:schemeClr val="tx1"/>
+          </a:fontRef>
+        </p:style>
+      </p:cxnSp>
+      <p:cxnSp>
+        <p:nvCxnSpPr>
+          <p:cNvPr id="46" name="Straight Arrow Connector 45">
+            <a:extLst>
+              <a:ext uri="{FF2B5EF4-FFF2-40B4-BE49-F238E27FC236}">
+                <a16:creationId xmlns:a16="http://schemas.microsoft.com/office/drawing/2014/main" id="{C1D7BEB1-8E6E-174B-B252-C7CA9D0DA90C}"/>
+              </a:ext>
+            </a:extLst>
+          </p:cNvPr>
+          <p:cNvCxnSpPr>
+            <a:cxnSpLocks/>
+            <a:stCxn id="29" idx="0"/>
+            <a:endCxn id="31" idx="1"/>
+          </p:cNvCxnSpPr>
+          <p:nvPr/>
+        </p:nvCxnSpPr>
+        <p:spPr>
+          <a:xfrm flipV="1">
+            <a:off x="9566050" y="5380503"/>
+            <a:ext cx="767530" cy="4849"/>
+          </a:xfrm>
+          <a:prstGeom prst="straightConnector1">
+            <a:avLst/>
+          </a:prstGeom>
+          <a:ln>
+            <a:tailEnd type="triangle"/>
+          </a:ln>
+        </p:spPr>
+        <p:style>
+          <a:lnRef idx="1">
+            <a:schemeClr val="accent1"/>
+          </a:lnRef>
+          <a:fillRef idx="0">
+            <a:schemeClr val="accent1"/>
+          </a:fillRef>
+          <a:effectRef idx="0">
+            <a:schemeClr val="accent1"/>
+          </a:effectRef>
+          <a:fontRef idx="minor">
+            <a:schemeClr val="tx1"/>
+          </a:fontRef>
+        </p:style>
+      </p:cxnSp>
+      <p:cxnSp>
+        <p:nvCxnSpPr>
+          <p:cNvPr id="47" name="Straight Arrow Connector 46">
+            <a:extLst>
+              <a:ext uri="{FF2B5EF4-FFF2-40B4-BE49-F238E27FC236}">
+                <a16:creationId xmlns:a16="http://schemas.microsoft.com/office/drawing/2014/main" id="{84915628-D2D3-964A-8A9C-020DF741435E}"/>
+              </a:ext>
+            </a:extLst>
+          </p:cNvPr>
+          <p:cNvCxnSpPr>
+            <a:cxnSpLocks/>
+            <a:stCxn id="28" idx="0"/>
+            <a:endCxn id="29" idx="2"/>
+          </p:cNvCxnSpPr>
+          <p:nvPr/>
+        </p:nvCxnSpPr>
+        <p:spPr>
+          <a:xfrm>
+            <a:off x="8879574" y="5380503"/>
+            <a:ext cx="317144" cy="4849"/>
+          </a:xfrm>
+          <a:prstGeom prst="straightConnector1">
+            <a:avLst/>
+          </a:prstGeom>
+          <a:ln>
+            <a:tailEnd type="triangle"/>
+          </a:ln>
+        </p:spPr>
+        <p:style>
+          <a:lnRef idx="1">
+            <a:schemeClr val="accent1"/>
+          </a:lnRef>
+          <a:fillRef idx="0">
+            <a:schemeClr val="accent1"/>
+          </a:fillRef>
+          <a:effectRef idx="0">
+            <a:schemeClr val="accent1"/>
+          </a:effectRef>
+          <a:fontRef idx="minor">
+            <a:schemeClr val="tx1"/>
+          </a:fontRef>
+        </p:style>
+      </p:cxnSp>
+      <p:sp>
+        <p:nvSpPr>
+          <p:cNvPr id="48" name="Rectangle 47">
+            <a:extLst>
+              <a:ext uri="{FF2B5EF4-FFF2-40B4-BE49-F238E27FC236}">
+                <a16:creationId xmlns:a16="http://schemas.microsoft.com/office/drawing/2014/main" id="{1BC6BE60-2B29-ED47-A8FF-5702CCFED406}"/>
+              </a:ext>
+            </a:extLst>
+          </p:cNvPr>
+          <p:cNvSpPr/>
+          <p:nvPr/>
+        </p:nvSpPr>
+        <p:spPr>
+          <a:xfrm>
+            <a:off x="6712493" y="2509950"/>
+            <a:ext cx="1627369" cy="369332"/>
+          </a:xfrm>
+          <a:prstGeom prst="rect">
+            <a:avLst/>
+          </a:prstGeom>
+        </p:spPr>
+        <p:txBody>
+          <a:bodyPr wrap="none">
+            <a:spAutoFit/>
+          </a:bodyPr>
+          <a:lstStyle/>
+          <a:p>
+            <a:r>
+              <a:rPr lang="en-US" dirty="0">
+                <a:solidFill>
+                  <a:sysClr val="windowText" lastClr="000000"/>
+                </a:solidFill>
+              </a:rPr>
+              <a:t>TEXT FEATURE</a:t>
+            </a:r>
+          </a:p>
+        </p:txBody>
+      </p:sp>
+      <p:sp>
+        <p:nvSpPr>
+          <p:cNvPr id="49" name="Rectangle 48">
+            <a:extLst>
+              <a:ext uri="{FF2B5EF4-FFF2-40B4-BE49-F238E27FC236}">
+                <a16:creationId xmlns:a16="http://schemas.microsoft.com/office/drawing/2014/main" id="{81A465DE-55E3-1549-A480-025691454215}"/>
+              </a:ext>
+            </a:extLst>
+          </p:cNvPr>
+          <p:cNvSpPr/>
+          <p:nvPr/>
+        </p:nvSpPr>
+        <p:spPr>
+          <a:xfrm rot="5400000">
+            <a:off x="10601194" y="3160913"/>
+            <a:ext cx="1388522" cy="369332"/>
+          </a:xfrm>
+          <a:prstGeom prst="rect">
+            <a:avLst/>
+          </a:prstGeom>
+        </p:spPr>
+        <p:txBody>
+          <a:bodyPr wrap="none">
+            <a:spAutoFit/>
+          </a:bodyPr>
+          <a:lstStyle/>
+          <a:p>
+            <a:r>
+              <a:rPr lang="en-US" dirty="0">
+                <a:solidFill>
+                  <a:sysClr val="windowText" lastClr="000000"/>
+                </a:solidFill>
+              </a:rPr>
+              <a:t>Fake News</a:t>
+            </a:r>
+          </a:p>
+        </p:txBody>
+      </p:sp>
+      <p:sp>
+        <p:nvSpPr>
+          <p:cNvPr id="50" name="Rectangle 49">
+            <a:extLst>
+              <a:ext uri="{FF2B5EF4-FFF2-40B4-BE49-F238E27FC236}">
+                <a16:creationId xmlns:a16="http://schemas.microsoft.com/office/drawing/2014/main" id="{C6E88245-1FEB-C343-9841-813516AB2B8A}"/>
+              </a:ext>
+            </a:extLst>
+          </p:cNvPr>
+          <p:cNvSpPr/>
+          <p:nvPr/>
+        </p:nvSpPr>
+        <p:spPr>
+          <a:xfrm rot="5400000">
+            <a:off x="10054771" y="5235318"/>
+            <a:ext cx="2491388" cy="369332"/>
+          </a:xfrm>
+          <a:prstGeom prst="rect">
+            <a:avLst/>
+          </a:prstGeom>
+        </p:spPr>
+        <p:txBody>
+          <a:bodyPr wrap="none">
+            <a:spAutoFit/>
+          </a:bodyPr>
+          <a:lstStyle/>
+          <a:p>
+            <a:r>
+              <a:rPr lang="en-US" dirty="0">
+                <a:solidFill>
+                  <a:sysClr val="windowText" lastClr="000000"/>
+                </a:solidFill>
+              </a:rPr>
+              <a:t>Adversarial Detector</a:t>
+            </a:r>
+          </a:p>
+        </p:txBody>
+      </p:sp>
+      <p:sp>
+        <p:nvSpPr>
+          <p:cNvPr id="51" name="Rectangle 50">
+            <a:extLst>
+              <a:ext uri="{FF2B5EF4-FFF2-40B4-BE49-F238E27FC236}">
+                <a16:creationId xmlns:a16="http://schemas.microsoft.com/office/drawing/2014/main" id="{D1F32906-C2BD-E14E-9FFB-C309371F384E}"/>
+              </a:ext>
+            </a:extLst>
+          </p:cNvPr>
+          <p:cNvSpPr/>
+          <p:nvPr/>
+        </p:nvSpPr>
+        <p:spPr>
+          <a:xfrm>
+            <a:off x="1347579" y="2724700"/>
+            <a:ext cx="748923" cy="369332"/>
+          </a:xfrm>
+          <a:prstGeom prst="rect">
+            <a:avLst/>
+          </a:prstGeom>
+        </p:spPr>
+        <p:txBody>
+          <a:bodyPr wrap="none">
+            <a:spAutoFit/>
+          </a:bodyPr>
+          <a:lstStyle/>
+          <a:p>
+            <a:pPr algn="ctr"/>
+            <a:r>
+              <a:rPr lang="en-US" i="1" dirty="0">
+                <a:solidFill>
+                  <a:sysClr val="windowText" lastClr="000000"/>
+                </a:solidFill>
+              </a:rPr>
+              <a:t>input</a:t>
+            </a:r>
+          </a:p>
+        </p:txBody>
+      </p:sp>
+      <p:sp>
+        <p:nvSpPr>
+          <p:cNvPr id="52" name="Rectangle 51">
+            <a:extLst>
+              <a:ext uri="{FF2B5EF4-FFF2-40B4-BE49-F238E27FC236}">
+                <a16:creationId xmlns:a16="http://schemas.microsoft.com/office/drawing/2014/main" id="{10E2AC78-1553-A24D-A5E0-FC73C9741E4D}"/>
+              </a:ext>
+            </a:extLst>
+          </p:cNvPr>
+          <p:cNvSpPr/>
+          <p:nvPr/>
+        </p:nvSpPr>
+        <p:spPr>
+          <a:xfrm>
+            <a:off x="5003987" y="3308216"/>
+            <a:ext cx="643125" cy="276999"/>
+          </a:xfrm>
+          <a:prstGeom prst="rect">
+            <a:avLst/>
+          </a:prstGeom>
+        </p:spPr>
+        <p:txBody>
+          <a:bodyPr wrap="none">
+            <a:spAutoFit/>
+          </a:bodyPr>
+          <a:lstStyle/>
+          <a:p>
+            <a:pPr algn="ctr"/>
+            <a:r>
+              <a:rPr lang="en-US" sz="1200" i="1" dirty="0">
+                <a:solidFill>
+                  <a:sysClr val="windowText" lastClr="000000"/>
+                </a:solidFill>
+              </a:rPr>
+              <a:t>&lt;CLS&gt;</a:t>
+            </a:r>
+          </a:p>
+        </p:txBody>
+      </p:sp>
+      <p:sp>
+        <p:nvSpPr>
+          <p:cNvPr id="55" name="Right Brace 54">
+            <a:extLst>
+              <a:ext uri="{FF2B5EF4-FFF2-40B4-BE49-F238E27FC236}">
+                <a16:creationId xmlns:a16="http://schemas.microsoft.com/office/drawing/2014/main" id="{B9820F23-8082-3B43-952C-4869CDACF2A3}"/>
+              </a:ext>
+            </a:extLst>
+          </p:cNvPr>
+          <p:cNvSpPr/>
+          <p:nvPr/>
+        </p:nvSpPr>
+        <p:spPr>
+          <a:xfrm rot="5400000">
+            <a:off x="4184689" y="3036022"/>
+            <a:ext cx="252830" cy="7002208"/>
+          </a:xfrm>
+          <a:prstGeom prst="rightBrace">
+            <a:avLst>
+              <a:gd name="adj1" fmla="val 8333"/>
+              <a:gd name="adj2" fmla="val 50129"/>
+            </a:avLst>
+          </a:prstGeom>
+        </p:spPr>
+        <p:style>
+          <a:lnRef idx="1">
+            <a:schemeClr val="accent1"/>
+          </a:lnRef>
+          <a:fillRef idx="0">
+            <a:schemeClr val="accent1"/>
+          </a:fillRef>
+          <a:effectRef idx="0">
+            <a:schemeClr val="accent1"/>
+          </a:effectRef>
+          <a:fontRef idx="minor">
+            <a:schemeClr val="tx1"/>
+          </a:fontRef>
+        </p:style>
+        <p:txBody>
+          <a:bodyPr rtlCol="0" anchor="ctr"/>
+          <a:lstStyle/>
+          <a:p>
+            <a:pPr algn="ctr"/>
+            <a:endParaRPr lang="en-US"/>
+          </a:p>
+        </p:txBody>
+      </p:sp>
+      <p:sp>
+        <p:nvSpPr>
+          <p:cNvPr id="56" name="Rectangle 55">
+            <a:extLst>
+              <a:ext uri="{FF2B5EF4-FFF2-40B4-BE49-F238E27FC236}">
+                <a16:creationId xmlns:a16="http://schemas.microsoft.com/office/drawing/2014/main" id="{575C346F-A328-5E43-ABD0-E98C9062D6C6}"/>
+              </a:ext>
+            </a:extLst>
+          </p:cNvPr>
+          <p:cNvSpPr/>
+          <p:nvPr/>
+        </p:nvSpPr>
+        <p:spPr>
+          <a:xfrm>
+            <a:off x="3914089" y="6574811"/>
+            <a:ext cx="739305" cy="369332"/>
+          </a:xfrm>
+          <a:prstGeom prst="rect">
+            <a:avLst/>
+          </a:prstGeom>
+        </p:spPr>
+        <p:txBody>
+          <a:bodyPr wrap="none">
+            <a:spAutoFit/>
+          </a:bodyPr>
+          <a:lstStyle/>
+          <a:p>
+            <a:r>
+              <a:rPr lang="en-US" i="1" dirty="0">
+                <a:solidFill>
+                  <a:sysClr val="windowText" lastClr="000000"/>
+                </a:solidFill>
+              </a:rPr>
+              <a:t>base</a:t>
+            </a:r>
+          </a:p>
+        </p:txBody>
+      </p:sp>
+      <p:sp>
+        <p:nvSpPr>
+          <p:cNvPr id="57" name="Rectangle 56">
+            <a:extLst>
+              <a:ext uri="{FF2B5EF4-FFF2-40B4-BE49-F238E27FC236}">
+                <a16:creationId xmlns:a16="http://schemas.microsoft.com/office/drawing/2014/main" id="{49207862-E886-6F45-A853-187C4631824A}"/>
+              </a:ext>
+            </a:extLst>
+          </p:cNvPr>
+          <p:cNvSpPr/>
+          <p:nvPr/>
+        </p:nvSpPr>
+        <p:spPr>
+          <a:xfrm>
+            <a:off x="7908259" y="6658888"/>
+            <a:ext cx="3118718" cy="369332"/>
+          </a:xfrm>
+          <a:prstGeom prst="rect">
+            <a:avLst/>
+          </a:prstGeom>
+        </p:spPr>
+        <p:txBody>
+          <a:bodyPr wrap="square">
+            <a:spAutoFit/>
+          </a:bodyPr>
+          <a:lstStyle/>
+          <a:p>
+            <a:pPr algn="ctr"/>
+            <a:r>
+              <a:rPr lang="en-US" i="1" dirty="0">
+                <a:solidFill>
+                  <a:sysClr val="windowText" lastClr="000000"/>
+                </a:solidFill>
+              </a:rPr>
+              <a:t>heads</a:t>
+            </a:r>
+          </a:p>
+        </p:txBody>
+      </p:sp>
+      <p:sp>
+        <p:nvSpPr>
+          <p:cNvPr id="60" name="Right Brace 59">
+            <a:extLst>
+              <a:ext uri="{FF2B5EF4-FFF2-40B4-BE49-F238E27FC236}">
+                <a16:creationId xmlns:a16="http://schemas.microsoft.com/office/drawing/2014/main" id="{CF598220-F102-614D-8C39-8C3D2E9ED86E}"/>
+              </a:ext>
+            </a:extLst>
+          </p:cNvPr>
+          <p:cNvSpPr/>
+          <p:nvPr/>
+        </p:nvSpPr>
+        <p:spPr>
+          <a:xfrm rot="5400000">
+            <a:off x="9341203" y="5061224"/>
+            <a:ext cx="252830" cy="2951094"/>
+          </a:xfrm>
+          <a:prstGeom prst="rightBrace">
+            <a:avLst/>
+          </a:prstGeom>
+        </p:spPr>
+        <p:style>
+          <a:lnRef idx="1">
+            <a:schemeClr val="accent1"/>
+          </a:lnRef>
+          <a:fillRef idx="0">
+            <a:schemeClr val="accent1"/>
+          </a:fillRef>
+          <a:effectRef idx="0">
+            <a:schemeClr val="accent1"/>
+          </a:effectRef>
+          <a:fontRef idx="minor">
+            <a:schemeClr val="tx1"/>
+          </a:fontRef>
+        </p:style>
+        <p:txBody>
+          <a:bodyPr rtlCol="0" anchor="ctr"/>
+          <a:lstStyle/>
+          <a:p>
+            <a:pPr algn="ctr"/>
+            <a:endParaRPr lang="en-US"/>
+          </a:p>
+        </p:txBody>
+      </p:sp>
+    </p:spTree>
+    <p:extLst>
+      <p:ext uri="{BB962C8B-B14F-4D97-AF65-F5344CB8AC3E}">
+        <p14:creationId xmlns:p14="http://schemas.microsoft.com/office/powerpoint/2010/main" val="3626068116"/>
+      </p:ext>
+    </p:extLst>
+  </p:cSld>
+  <p:clrMapOvr>
+    <a:masterClrMapping/>
+  </p:clrMapOvr>
+</p:sld>
+</file>
+
+<file path=ppt/slides/slide9.xml><?xml version="1.0" encoding="utf-8"?>
 <p:sld xmlns:a="http://schemas.openxmlformats.org/drawingml/2006/main" xmlns:r="http://schemas.openxmlformats.org/officeDocument/2006/relationships" xmlns:p="http://schemas.openxmlformats.org/presentationml/2006/main">
   <p:cSld>
     <p:spTree>
@@ -17880,357 +20783,6 @@
     <p:extLst>
       <p:ext uri="{BB962C8B-B14F-4D97-AF65-F5344CB8AC3E}">
         <p14:creationId xmlns:p14="http://schemas.microsoft.com/office/powerpoint/2010/main" val="1983763271"/>
-      </p:ext>
-    </p:extLst>
-  </p:cSld>
-  <p:clrMapOvr>
-    <a:masterClrMapping/>
-  </p:clrMapOvr>
-</p:sld>
-</file>
-
-<file path=ppt/slides/slide9.xml><?xml version="1.0" encoding="utf-8"?>
-<p:sld xmlns:a="http://schemas.openxmlformats.org/drawingml/2006/main" xmlns:r="http://schemas.openxmlformats.org/officeDocument/2006/relationships" xmlns:p="http://schemas.openxmlformats.org/presentationml/2006/main">
-  <p:cSld>
-    <p:spTree>
-      <p:nvGrpSpPr>
-        <p:cNvPr id="1" name=""/>
-        <p:cNvGrpSpPr/>
-        <p:nvPr/>
-      </p:nvGrpSpPr>
-      <p:grpSpPr>
-        <a:xfrm>
-          <a:off x="0" y="0"/>
-          <a:ext cx="0" cy="0"/>
-          <a:chOff x="0" y="0"/>
-          <a:chExt cx="0" cy="0"/>
-        </a:xfrm>
-      </p:grpSpPr>
-      <p:sp>
-        <p:nvSpPr>
-          <p:cNvPr id="2" name="Title 1">
-            <a:extLst>
-              <a:ext uri="{FF2B5EF4-FFF2-40B4-BE49-F238E27FC236}">
-                <a16:creationId xmlns:a16="http://schemas.microsoft.com/office/drawing/2014/main" id="{2473E1A0-9C6F-D149-96C5-5B9801F1AA1C}"/>
-              </a:ext>
-            </a:extLst>
-          </p:cNvPr>
-          <p:cNvSpPr>
-            <a:spLocks noGrp="1"/>
-          </p:cNvSpPr>
-          <p:nvPr>
-            <p:ph type="title"/>
-          </p:nvPr>
-        </p:nvSpPr>
-        <p:spPr/>
-        <p:txBody>
-          <a:bodyPr/>
-          <a:lstStyle/>
-          <a:p>
-            <a:r>
-              <a:rPr lang="en-US" dirty="0"/>
-              <a:t>Issues So Far</a:t>
-            </a:r>
-          </a:p>
-        </p:txBody>
-      </p:sp>
-      <p:sp>
-        <p:nvSpPr>
-          <p:cNvPr id="3" name="Content Placeholder 2">
-            <a:extLst>
-              <a:ext uri="{FF2B5EF4-FFF2-40B4-BE49-F238E27FC236}">
-                <a16:creationId xmlns:a16="http://schemas.microsoft.com/office/drawing/2014/main" id="{530BE401-7E09-1347-A74D-C202C26C8E69}"/>
-              </a:ext>
-            </a:extLst>
-          </p:cNvPr>
-          <p:cNvSpPr>
-            <a:spLocks noGrp="1"/>
-          </p:cNvSpPr>
-          <p:nvPr>
-            <p:ph idx="1"/>
-          </p:nvPr>
-        </p:nvSpPr>
-        <p:spPr>
-          <a:xfrm>
-            <a:off x="379800" y="2267712"/>
-            <a:ext cx="7679111" cy="4143100"/>
-          </a:xfrm>
-        </p:spPr>
-        <p:txBody>
-          <a:bodyPr>
-            <a:normAutofit/>
-          </a:bodyPr>
-          <a:lstStyle/>
-          <a:p>
-            <a:r>
-              <a:rPr lang="en-US" sz="2400" dirty="0"/>
-              <a:t>Dataset not labelled for events </a:t>
-            </a:r>
-            <a:r>
-              <a:rPr lang="en-US" sz="2400" dirty="0">
-                <a:sym typeface="Wingdings" pitchFamily="2" charset="2"/>
-              </a:rPr>
-              <a:t> keywords</a:t>
-            </a:r>
-          </a:p>
-          <a:p>
-            <a:r>
-              <a:rPr lang="en-US" sz="2400" dirty="0">
-                <a:sym typeface="Wingdings" pitchFamily="2" charset="2"/>
-              </a:rPr>
-              <a:t>Articles with common keywords have uneven distribution</a:t>
-            </a:r>
-          </a:p>
-          <a:p>
-            <a:pPr marL="0" indent="0">
-              <a:buNone/>
-            </a:pPr>
-            <a:endParaRPr lang="en-US" sz="2400" dirty="0">
-              <a:sym typeface="Wingdings" pitchFamily="2" charset="2"/>
-            </a:endParaRPr>
-          </a:p>
-          <a:p>
-            <a:r>
-              <a:rPr lang="en-US" sz="2400" dirty="0">
-                <a:sym typeface="Wingdings" pitchFamily="2" charset="2"/>
-              </a:rPr>
-              <a:t>CUDA Memory issues  Using CPU</a:t>
-            </a:r>
-          </a:p>
-          <a:p>
-            <a:r>
-              <a:rPr lang="en-US" sz="2400" dirty="0">
-                <a:sym typeface="Wingdings" pitchFamily="2" charset="2"/>
-              </a:rPr>
-              <a:t>Slow performance (1 epoch taking 7+ hours) </a:t>
-            </a:r>
-          </a:p>
-          <a:p>
-            <a:pPr lvl="1"/>
-            <a:r>
-              <a:rPr lang="en-US" sz="1800" dirty="0">
-                <a:sym typeface="Wingdings" pitchFamily="2" charset="2"/>
-              </a:rPr>
-              <a:t> No performance results yet</a:t>
-            </a:r>
-          </a:p>
-          <a:p>
-            <a:endParaRPr lang="en-US" dirty="0"/>
-          </a:p>
-        </p:txBody>
-      </p:sp>
-      <p:grpSp>
-        <p:nvGrpSpPr>
-          <p:cNvPr id="10" name="Group 9">
-            <a:extLst>
-              <a:ext uri="{FF2B5EF4-FFF2-40B4-BE49-F238E27FC236}">
-                <a16:creationId xmlns:a16="http://schemas.microsoft.com/office/drawing/2014/main" id="{5DE90424-EEF2-344A-BABD-F5923B4EE34C}"/>
-              </a:ext>
-            </a:extLst>
-          </p:cNvPr>
-          <p:cNvGrpSpPr/>
-          <p:nvPr/>
-        </p:nvGrpSpPr>
-        <p:grpSpPr>
-          <a:xfrm>
-            <a:off x="7943088" y="0"/>
-            <a:ext cx="4248913" cy="6858001"/>
-            <a:chOff x="7943088" y="0"/>
-            <a:chExt cx="4248913" cy="6858001"/>
-          </a:xfrm>
-        </p:grpSpPr>
-        <p:sp>
-          <p:nvSpPr>
-            <p:cNvPr id="8" name="Rectangle 7">
-              <a:extLst>
-                <a:ext uri="{FF2B5EF4-FFF2-40B4-BE49-F238E27FC236}">
-                  <a16:creationId xmlns:a16="http://schemas.microsoft.com/office/drawing/2014/main" id="{4F1F66F9-73B9-F345-B94E-44B8BD16DEDA}"/>
-                </a:ext>
-              </a:extLst>
-            </p:cNvPr>
-            <p:cNvSpPr/>
-            <p:nvPr/>
-          </p:nvSpPr>
-          <p:spPr>
-            <a:xfrm>
-              <a:off x="7943088" y="0"/>
-              <a:ext cx="4248912" cy="6858000"/>
-            </a:xfrm>
-            <a:prstGeom prst="rect">
-              <a:avLst/>
-            </a:prstGeom>
-            <a:solidFill>
-              <a:schemeClr val="tx1"/>
-            </a:solidFill>
-          </p:spPr>
-          <p:style>
-            <a:lnRef idx="2">
-              <a:schemeClr val="accent1">
-                <a:shade val="50000"/>
-              </a:schemeClr>
-            </a:lnRef>
-            <a:fillRef idx="1">
-              <a:schemeClr val="accent1"/>
-            </a:fillRef>
-            <a:effectRef idx="0">
-              <a:schemeClr val="accent1"/>
-            </a:effectRef>
-            <a:fontRef idx="minor">
-              <a:schemeClr val="lt1"/>
-            </a:fontRef>
-          </p:style>
-          <p:txBody>
-            <a:bodyPr rtlCol="0" anchor="ctr"/>
-            <a:lstStyle/>
-            <a:p>
-              <a:pPr algn="ctr"/>
-              <a:endParaRPr lang="en-US" dirty="0"/>
-            </a:p>
-          </p:txBody>
-        </p:sp>
-        <p:pic>
-          <p:nvPicPr>
-            <p:cNvPr id="5" name="Picture 4">
-              <a:extLst>
-                <a:ext uri="{FF2B5EF4-FFF2-40B4-BE49-F238E27FC236}">
-                  <a16:creationId xmlns:a16="http://schemas.microsoft.com/office/drawing/2014/main" id="{D966ED10-4156-D740-8C3B-5DEB7BD547DE}"/>
-                </a:ext>
-              </a:extLst>
-            </p:cNvPr>
-            <p:cNvPicPr>
-              <a:picLocks noChangeAspect="1"/>
-            </p:cNvPicPr>
-            <p:nvPr/>
-          </p:nvPicPr>
-          <p:blipFill>
-            <a:blip r:embed="rId2"/>
-            <a:stretch>
-              <a:fillRect/>
-            </a:stretch>
-          </p:blipFill>
-          <p:spPr>
-            <a:xfrm>
-              <a:off x="8058912" y="184666"/>
-              <a:ext cx="4133088" cy="3041993"/>
-            </a:xfrm>
-            <a:prstGeom prst="rect">
-              <a:avLst/>
-            </a:prstGeom>
-          </p:spPr>
-        </p:pic>
-        <p:sp>
-          <p:nvSpPr>
-            <p:cNvPr id="6" name="Rectangle 5">
-              <a:extLst>
-                <a:ext uri="{FF2B5EF4-FFF2-40B4-BE49-F238E27FC236}">
-                  <a16:creationId xmlns:a16="http://schemas.microsoft.com/office/drawing/2014/main" id="{5A18FE7D-9BC0-AB48-8C30-D547B7CD2D42}"/>
-                </a:ext>
-              </a:extLst>
-            </p:cNvPr>
-            <p:cNvSpPr/>
-            <p:nvPr/>
-          </p:nvSpPr>
-          <p:spPr>
-            <a:xfrm>
-              <a:off x="8058912" y="0"/>
-              <a:ext cx="4133088" cy="369332"/>
-            </a:xfrm>
-            <a:prstGeom prst="rect">
-              <a:avLst/>
-            </a:prstGeom>
-          </p:spPr>
-          <p:txBody>
-            <a:bodyPr wrap="square">
-              <a:spAutoFit/>
-            </a:bodyPr>
-            <a:lstStyle/>
-            <a:p>
-              <a:pPr algn="ctr"/>
-              <a:r>
-                <a:rPr lang="en-US" dirty="0">
-                  <a:solidFill>
-                    <a:schemeClr val="bg1"/>
-                  </a:solidFill>
-                </a:rPr>
-                <a:t>Fake/Real distribution (unfiltered)</a:t>
-              </a:r>
-            </a:p>
-          </p:txBody>
-        </p:sp>
-        <p:pic>
-          <p:nvPicPr>
-            <p:cNvPr id="7" name="Picture 6">
-              <a:extLst>
-                <a:ext uri="{FF2B5EF4-FFF2-40B4-BE49-F238E27FC236}">
-                  <a16:creationId xmlns:a16="http://schemas.microsoft.com/office/drawing/2014/main" id="{9B8B4584-D84D-F14F-98B3-8274B00F7F4D}"/>
-                </a:ext>
-              </a:extLst>
-            </p:cNvPr>
-            <p:cNvPicPr>
-              <a:picLocks noChangeAspect="1"/>
-            </p:cNvPicPr>
-            <p:nvPr/>
-          </p:nvPicPr>
-          <p:blipFill>
-            <a:blip r:embed="rId3"/>
-            <a:stretch>
-              <a:fillRect/>
-            </a:stretch>
-          </p:blipFill>
-          <p:spPr>
-            <a:xfrm>
-              <a:off x="8058913" y="3941407"/>
-              <a:ext cx="4133088" cy="2916594"/>
-            </a:xfrm>
-            <a:prstGeom prst="rect">
-              <a:avLst/>
-            </a:prstGeom>
-          </p:spPr>
-        </p:pic>
-        <p:sp>
-          <p:nvSpPr>
-            <p:cNvPr id="9" name="Rectangle 8">
-              <a:extLst>
-                <a:ext uri="{FF2B5EF4-FFF2-40B4-BE49-F238E27FC236}">
-                  <a16:creationId xmlns:a16="http://schemas.microsoft.com/office/drawing/2014/main" id="{B7B7C281-36F2-2F41-9065-A200FDFE00E1}"/>
-                </a:ext>
-              </a:extLst>
-            </p:cNvPr>
-            <p:cNvSpPr/>
-            <p:nvPr/>
-          </p:nvSpPr>
-          <p:spPr>
-            <a:xfrm>
-              <a:off x="8058912" y="3631342"/>
-              <a:ext cx="4133088" cy="369332"/>
-            </a:xfrm>
-            <a:prstGeom prst="rect">
-              <a:avLst/>
-            </a:prstGeom>
-          </p:spPr>
-          <p:txBody>
-            <a:bodyPr wrap="square">
-              <a:spAutoFit/>
-            </a:bodyPr>
-            <a:lstStyle/>
-            <a:p>
-              <a:pPr algn="ctr"/>
-              <a:r>
-                <a:rPr lang="en-US" dirty="0">
-                  <a:solidFill>
-                    <a:schemeClr val="bg1"/>
-                  </a:solidFill>
-                </a:rPr>
-                <a:t>Fake/Real distribution (filtered)</a:t>
-              </a:r>
-            </a:p>
-          </p:txBody>
-        </p:sp>
-      </p:grpSp>
-    </p:spTree>
-    <p:extLst>
-      <p:ext uri="{BB962C8B-B14F-4D97-AF65-F5344CB8AC3E}">
-        <p14:creationId xmlns:p14="http://schemas.microsoft.com/office/powerpoint/2010/main" val="1201209374"/>
       </p:ext>
     </p:extLst>
   </p:cSld>

</xml_diff>